<commit_message>
added app title + logo to pres
</commit_message>
<xml_diff>
--- a/pres.pptx
+++ b/pres.pptx
@@ -6,6 +6,7 @@
   </p:sldMasterIdLst>
   <p:sldIdLst>
     <p:sldId id="259" r:id="rId2"/>
+    <p:sldId id="256" r:id="rId3"/>
   </p:sldIdLst>
   <p:sldSz cx="12192000" cy="6858000"/>
   <p:notesSz cx="6858000" cy="9144000"/>
@@ -5951,6 +5952,3661 @@
 </p:sld>
 </file>
 
+<file path=ppt/slides/slide2.xml><?xml version="1.0" encoding="utf-8"?>
+<p:sld xmlns:a="http://schemas.openxmlformats.org/drawingml/2006/main" xmlns:r="http://schemas.openxmlformats.org/officeDocument/2006/relationships" xmlns:p="http://schemas.openxmlformats.org/presentationml/2006/main">
+  <p:cSld>
+    <p:bg>
+      <p:bgPr>
+        <a:solidFill>
+          <a:schemeClr val="bg1"/>
+        </a:solidFill>
+        <a:effectLst/>
+      </p:bgPr>
+    </p:bg>
+    <p:spTree>
+      <p:nvGrpSpPr>
+        <p:cNvPr id="1" name=""/>
+        <p:cNvGrpSpPr/>
+        <p:nvPr/>
+      </p:nvGrpSpPr>
+      <p:grpSpPr>
+        <a:xfrm>
+          <a:off x="0" y="0"/>
+          <a:ext cx="0" cy="0"/>
+          <a:chOff x="0" y="0"/>
+          <a:chExt cx="0" cy="0"/>
+        </a:xfrm>
+      </p:grpSpPr>
+      <p:sp useBgFill="1">
+        <p:nvSpPr>
+          <p:cNvPr id="31" name="Rectangle 14">
+            <a:extLst>
+              <a:ext uri="{FF2B5EF4-FFF2-40B4-BE49-F238E27FC236}">
+                <a16:creationId xmlns:a16="http://schemas.microsoft.com/office/drawing/2014/main" id="{4FD4A2AD-E2FD-4CAD-8DEF-75993D7E4C7D}"/>
+              </a:ext>
+              <a:ext uri="{C183D7F6-B498-43B3-948B-1728B52AA6E4}">
+                <adec:decorative xmlns:adec="http://schemas.microsoft.com/office/drawing/2017/decorative" val="1"/>
+              </a:ext>
+            </a:extLst>
+          </p:cNvPr>
+          <p:cNvSpPr>
+            <a:spLocks noGrp="1" noRot="1" noChangeAspect="1" noMove="1" noResize="1" noEditPoints="1" noAdjustHandles="1" noChangeArrowheads="1" noChangeShapeType="1" noTextEdit="1"/>
+          </p:cNvSpPr>
+          <p:nvPr>
+            <p:extLst>
+              <p:ext uri="{386F3935-93C4-4BCD-93E2-E3B085C9AB24}">
+                <p16:designElem xmlns:p16="http://schemas.microsoft.com/office/powerpoint/2015/main" val="1"/>
+              </p:ext>
+            </p:extLst>
+          </p:nvPr>
+        </p:nvSpPr>
+        <p:spPr>
+          <a:xfrm>
+            <a:off x="0" y="0"/>
+            <a:ext cx="12192000" cy="6858000"/>
+          </a:xfrm>
+          <a:prstGeom prst="rect">
+            <a:avLst/>
+          </a:prstGeom>
+          <a:ln>
+            <a:noFill/>
+          </a:ln>
+        </p:spPr>
+        <p:style>
+          <a:lnRef idx="2">
+            <a:schemeClr val="accent1">
+              <a:shade val="50000"/>
+            </a:schemeClr>
+          </a:lnRef>
+          <a:fillRef idx="1">
+            <a:schemeClr val="accent1"/>
+          </a:fillRef>
+          <a:effectRef idx="0">
+            <a:schemeClr val="accent1"/>
+          </a:effectRef>
+          <a:fontRef idx="minor">
+            <a:schemeClr val="lt1"/>
+          </a:fontRef>
+        </p:style>
+        <p:txBody>
+          <a:bodyPr rtlCol="0" anchor="ctr"/>
+          <a:lstStyle/>
+          <a:p>
+            <a:pPr algn="ctr"/>
+            <a:endParaRPr lang="en-US"/>
+          </a:p>
+        </p:txBody>
+      </p:sp>
+      <p:sp>
+        <p:nvSpPr>
+          <p:cNvPr id="32" name="Rectangle 16">
+            <a:extLst>
+              <a:ext uri="{FF2B5EF4-FFF2-40B4-BE49-F238E27FC236}">
+                <a16:creationId xmlns:a16="http://schemas.microsoft.com/office/drawing/2014/main" id="{430E65E5-31AD-4B0E-8D4C-6526CAAE2C84}"/>
+              </a:ext>
+              <a:ext uri="{C183D7F6-B498-43B3-948B-1728B52AA6E4}">
+                <adec:decorative xmlns:adec="http://schemas.microsoft.com/office/drawing/2017/decorative" val="1"/>
+              </a:ext>
+            </a:extLst>
+          </p:cNvPr>
+          <p:cNvSpPr>
+            <a:spLocks noGrp="1" noRot="1" noChangeAspect="1" noMove="1" noResize="1" noEditPoints="1" noAdjustHandles="1" noChangeArrowheads="1" noChangeShapeType="1" noTextEdit="1"/>
+          </p:cNvSpPr>
+          <p:nvPr>
+            <p:extLst>
+              <p:ext uri="{386F3935-93C4-4BCD-93E2-E3B085C9AB24}">
+                <p16:designElem xmlns:p16="http://schemas.microsoft.com/office/powerpoint/2015/main" val="1"/>
+              </p:ext>
+            </p:extLst>
+          </p:nvPr>
+        </p:nvSpPr>
+        <p:spPr>
+          <a:xfrm>
+            <a:off x="305" y="0"/>
+            <a:ext cx="12191695" cy="6858000"/>
+          </a:xfrm>
+          <a:prstGeom prst="rect">
+            <a:avLst/>
+          </a:prstGeom>
+          <a:solidFill>
+            <a:schemeClr val="bg1"/>
+          </a:solidFill>
+          <a:ln>
+            <a:noFill/>
+          </a:ln>
+        </p:spPr>
+        <p:style>
+          <a:lnRef idx="2">
+            <a:schemeClr val="accent1">
+              <a:shade val="50000"/>
+            </a:schemeClr>
+          </a:lnRef>
+          <a:fillRef idx="1">
+            <a:schemeClr val="accent1"/>
+          </a:fillRef>
+          <a:effectRef idx="0">
+            <a:schemeClr val="accent1"/>
+          </a:effectRef>
+          <a:fontRef idx="minor">
+            <a:schemeClr val="lt1"/>
+          </a:fontRef>
+        </p:style>
+        <p:txBody>
+          <a:bodyPr rtlCol="0" anchor="ctr"/>
+          <a:lstStyle/>
+          <a:p>
+            <a:pPr algn="ctr"/>
+            <a:endParaRPr lang="en-US"/>
+          </a:p>
+        </p:txBody>
+      </p:sp>
+      <p:grpSp>
+        <p:nvGrpSpPr>
+          <p:cNvPr id="33" name="Group 18">
+            <a:extLst>
+              <a:ext uri="{FF2B5EF4-FFF2-40B4-BE49-F238E27FC236}">
+                <a16:creationId xmlns:a16="http://schemas.microsoft.com/office/drawing/2014/main" id="{1B65B678-A993-4BFF-AE12-E1A2FC66BB78}"/>
+              </a:ext>
+              <a:ext uri="{C183D7F6-B498-43B3-948B-1728B52AA6E4}">
+                <adec:decorative xmlns:adec="http://schemas.microsoft.com/office/drawing/2017/decorative" val="1"/>
+              </a:ext>
+            </a:extLst>
+          </p:cNvPr>
+          <p:cNvGrpSpPr>
+            <a:grpSpLocks noGrp="1" noUngrp="1" noRot="1" noChangeAspect="1" noMove="1" noResize="1"/>
+          </p:cNvGrpSpPr>
+          <p:nvPr>
+            <p:extLst>
+              <p:ext uri="{386F3935-93C4-4BCD-93E2-E3B085C9AB24}">
+                <p16:designElem xmlns:p16="http://schemas.microsoft.com/office/powerpoint/2015/main" val="1"/>
+              </p:ext>
+            </p:extLst>
+          </p:nvPr>
+        </p:nvGrpSpPr>
+        <p:grpSpPr>
+          <a:xfrm>
+            <a:off x="-19221" y="0"/>
+            <a:ext cx="5646974" cy="6483075"/>
+            <a:chOff x="-19221" y="0"/>
+            <a:chExt cx="5646974" cy="6483075"/>
+          </a:xfrm>
+        </p:grpSpPr>
+        <p:sp>
+          <p:nvSpPr>
+            <p:cNvPr id="34" name="Freeform: Shape 19">
+              <a:extLst>
+                <a:ext uri="{FF2B5EF4-FFF2-40B4-BE49-F238E27FC236}">
+                  <a16:creationId xmlns:a16="http://schemas.microsoft.com/office/drawing/2014/main" id="{265A95B7-D327-4B86-92B5-EC4B891D598C}"/>
+                </a:ext>
+                <a:ext uri="{C183D7F6-B498-43B3-948B-1728B52AA6E4}">
+                  <adec:decorative xmlns:adec="http://schemas.microsoft.com/office/drawing/2017/decorative" val="1"/>
+                </a:ext>
+              </a:extLst>
+            </p:cNvPr>
+            <p:cNvSpPr/>
+            <p:nvPr>
+              <p:extLst>
+                <p:ext uri="{386F3935-93C4-4BCD-93E2-E3B085C9AB24}">
+                  <p16:designElem xmlns:p16="http://schemas.microsoft.com/office/powerpoint/2015/main" val="1"/>
+                </p:ext>
+              </p:extLst>
+            </p:nvPr>
+          </p:nvSpPr>
+          <p:spPr>
+            <a:xfrm>
+              <a:off x="-19220" y="116610"/>
+              <a:ext cx="5535001" cy="6250127"/>
+            </a:xfrm>
+            <a:custGeom>
+              <a:avLst/>
+              <a:gdLst>
+                <a:gd name="connsiteX0" fmla="*/ 2510242 w 5535001"/>
+                <a:gd name="connsiteY0" fmla="*/ 174 h 6250127"/>
+                <a:gd name="connsiteX1" fmla="*/ 2550551 w 5535001"/>
+                <a:gd name="connsiteY1" fmla="*/ 510 h 6250127"/>
+                <a:gd name="connsiteX2" fmla="*/ 2629490 w 5535001"/>
+                <a:gd name="connsiteY2" fmla="*/ 3757 h 6250127"/>
+                <a:gd name="connsiteX3" fmla="*/ 2708317 w 5535001"/>
+                <a:gd name="connsiteY3" fmla="*/ 7229 h 6250127"/>
+                <a:gd name="connsiteX4" fmla="*/ 2787256 w 5535001"/>
+                <a:gd name="connsiteY4" fmla="*/ 14619 h 6250127"/>
+                <a:gd name="connsiteX5" fmla="*/ 3408467 w 5535001"/>
+                <a:gd name="connsiteY5" fmla="*/ 145064 h 6250127"/>
+                <a:gd name="connsiteX6" fmla="*/ 3557723 w 5535001"/>
+                <a:gd name="connsiteY6" fmla="*/ 199593 h 6250127"/>
+                <a:gd name="connsiteX7" fmla="*/ 3594337 w 5535001"/>
+                <a:gd name="connsiteY7" fmla="*/ 214597 h 6250127"/>
+                <a:gd name="connsiteX8" fmla="*/ 3630616 w 5535001"/>
+                <a:gd name="connsiteY8" fmla="*/ 230385 h 6250127"/>
+                <a:gd name="connsiteX9" fmla="*/ 3703172 w 5535001"/>
+                <a:gd name="connsiteY9" fmla="*/ 262073 h 6250127"/>
+                <a:gd name="connsiteX10" fmla="*/ 3739003 w 5535001"/>
+                <a:gd name="connsiteY10" fmla="*/ 278756 h 6250127"/>
+                <a:gd name="connsiteX11" fmla="*/ 3756806 w 5535001"/>
+                <a:gd name="connsiteY11" fmla="*/ 287266 h 6250127"/>
+                <a:gd name="connsiteX12" fmla="*/ 3773714 w 5535001"/>
+                <a:gd name="connsiteY12" fmla="*/ 297567 h 6250127"/>
+                <a:gd name="connsiteX13" fmla="*/ 3840784 w 5535001"/>
+                <a:gd name="connsiteY13" fmla="*/ 339332 h 6250127"/>
+                <a:gd name="connsiteX14" fmla="*/ 3873927 w 5535001"/>
+                <a:gd name="connsiteY14" fmla="*/ 360495 h 6250127"/>
+                <a:gd name="connsiteX15" fmla="*/ 3906062 w 5535001"/>
+                <a:gd name="connsiteY15" fmla="*/ 383001 h 6250127"/>
+                <a:gd name="connsiteX16" fmla="*/ 3969662 w 5535001"/>
+                <a:gd name="connsiteY16" fmla="*/ 428572 h 6250127"/>
+                <a:gd name="connsiteX17" fmla="*/ 4423029 w 5535001"/>
+                <a:gd name="connsiteY17" fmla="*/ 837600 h 6250127"/>
+                <a:gd name="connsiteX18" fmla="*/ 4474647 w 5535001"/>
+                <a:gd name="connsiteY18" fmla="*/ 891569 h 6250127"/>
+                <a:gd name="connsiteX19" fmla="*/ 4524250 w 5535001"/>
+                <a:gd name="connsiteY19" fmla="*/ 946883 h 6250127"/>
+                <a:gd name="connsiteX20" fmla="*/ 4573965 w 5535001"/>
+                <a:gd name="connsiteY20" fmla="*/ 1001748 h 6250127"/>
+                <a:gd name="connsiteX21" fmla="*/ 4622224 w 5535001"/>
+                <a:gd name="connsiteY21" fmla="*/ 1057509 h 6250127"/>
+                <a:gd name="connsiteX22" fmla="*/ 4717510 w 5535001"/>
+                <a:gd name="connsiteY22" fmla="*/ 1169143 h 6250127"/>
+                <a:gd name="connsiteX23" fmla="*/ 4764986 w 5535001"/>
+                <a:gd name="connsiteY23" fmla="*/ 1224681 h 6250127"/>
+                <a:gd name="connsiteX24" fmla="*/ 4813021 w 5535001"/>
+                <a:gd name="connsiteY24" fmla="*/ 1279994 h 6250127"/>
+                <a:gd name="connsiteX25" fmla="*/ 5001915 w 5535001"/>
+                <a:gd name="connsiteY25" fmla="*/ 1506846 h 6250127"/>
+                <a:gd name="connsiteX26" fmla="*/ 5170542 w 5535001"/>
+                <a:gd name="connsiteY26" fmla="*/ 1751165 h 6250127"/>
+                <a:gd name="connsiteX27" fmla="*/ 5428969 w 5535001"/>
+                <a:gd name="connsiteY27" fmla="*/ 2293660 h 6250127"/>
+                <a:gd name="connsiteX28" fmla="*/ 5534893 w 5535001"/>
+                <a:gd name="connsiteY28" fmla="*/ 2899307 h 6250127"/>
+                <a:gd name="connsiteX29" fmla="*/ 5508804 w 5535001"/>
+                <a:gd name="connsiteY29" fmla="*/ 3211144 h 6250127"/>
+                <a:gd name="connsiteX30" fmla="*/ 5426282 w 5535001"/>
+                <a:gd name="connsiteY30" fmla="*/ 3513352 h 6250127"/>
+                <a:gd name="connsiteX31" fmla="*/ 5248250 w 5535001"/>
+                <a:gd name="connsiteY31" fmla="*/ 4030542 h 6250127"/>
+                <a:gd name="connsiteX32" fmla="*/ 5208612 w 5535001"/>
+                <a:gd name="connsiteY32" fmla="*/ 4161771 h 6250127"/>
+                <a:gd name="connsiteX33" fmla="*/ 5170318 w 5535001"/>
+                <a:gd name="connsiteY33" fmla="*/ 4294680 h 6250127"/>
+                <a:gd name="connsiteX34" fmla="*/ 5132248 w 5535001"/>
+                <a:gd name="connsiteY34" fmla="*/ 4430164 h 6250127"/>
+                <a:gd name="connsiteX35" fmla="*/ 5112765 w 5535001"/>
+                <a:gd name="connsiteY35" fmla="*/ 4498914 h 6250127"/>
+                <a:gd name="connsiteX36" fmla="*/ 5091715 w 5535001"/>
+                <a:gd name="connsiteY36" fmla="*/ 4569119 h 6250127"/>
+                <a:gd name="connsiteX37" fmla="*/ 5068985 w 5535001"/>
+                <a:gd name="connsiteY37" fmla="*/ 4640220 h 6250127"/>
+                <a:gd name="connsiteX38" fmla="*/ 5043904 w 5535001"/>
+                <a:gd name="connsiteY38" fmla="*/ 4712105 h 6250127"/>
+                <a:gd name="connsiteX39" fmla="*/ 5015799 w 5535001"/>
+                <a:gd name="connsiteY39" fmla="*/ 4784438 h 6250127"/>
+                <a:gd name="connsiteX40" fmla="*/ 4982880 w 5535001"/>
+                <a:gd name="connsiteY40" fmla="*/ 4856435 h 6250127"/>
+                <a:gd name="connsiteX41" fmla="*/ 4817276 w 5535001"/>
+                <a:gd name="connsiteY41" fmla="*/ 5125275 h 6250127"/>
+                <a:gd name="connsiteX42" fmla="*/ 4618753 w 5535001"/>
+                <a:gd name="connsiteY42" fmla="*/ 5355374 h 6250127"/>
+                <a:gd name="connsiteX43" fmla="*/ 4566575 w 5535001"/>
+                <a:gd name="connsiteY43" fmla="*/ 5408560 h 6250127"/>
+                <a:gd name="connsiteX44" fmla="*/ 4513837 w 5535001"/>
+                <a:gd name="connsiteY44" fmla="*/ 5461186 h 6250127"/>
+                <a:gd name="connsiteX45" fmla="*/ 4459531 w 5535001"/>
+                <a:gd name="connsiteY45" fmla="*/ 5512580 h 6250127"/>
+                <a:gd name="connsiteX46" fmla="*/ 4404554 w 5535001"/>
+                <a:gd name="connsiteY46" fmla="*/ 5563526 h 6250127"/>
+                <a:gd name="connsiteX47" fmla="*/ 4348009 w 5535001"/>
+                <a:gd name="connsiteY47" fmla="*/ 5613017 h 6250127"/>
+                <a:gd name="connsiteX48" fmla="*/ 4290568 w 5535001"/>
+                <a:gd name="connsiteY48" fmla="*/ 5661948 h 6250127"/>
+                <a:gd name="connsiteX49" fmla="*/ 4276124 w 5535001"/>
+                <a:gd name="connsiteY49" fmla="*/ 5674153 h 6250127"/>
+                <a:gd name="connsiteX50" fmla="*/ 4261120 w 5535001"/>
+                <a:gd name="connsiteY50" fmla="*/ 5685798 h 6250127"/>
+                <a:gd name="connsiteX51" fmla="*/ 4231112 w 5535001"/>
+                <a:gd name="connsiteY51" fmla="*/ 5708976 h 6250127"/>
+                <a:gd name="connsiteX52" fmla="*/ 4170984 w 5535001"/>
+                <a:gd name="connsiteY52" fmla="*/ 5755443 h 6250127"/>
+                <a:gd name="connsiteX53" fmla="*/ 4046025 w 5535001"/>
+                <a:gd name="connsiteY53" fmla="*/ 5843228 h 6250127"/>
+                <a:gd name="connsiteX54" fmla="*/ 3915356 w 5535001"/>
+                <a:gd name="connsiteY54" fmla="*/ 5923735 h 6250127"/>
+                <a:gd name="connsiteX55" fmla="*/ 3346323 w 5535001"/>
+                <a:gd name="connsiteY55" fmla="*/ 6158872 h 6250127"/>
+                <a:gd name="connsiteX56" fmla="*/ 2743476 w 5535001"/>
+                <a:gd name="connsiteY56" fmla="*/ 6247328 h 6250127"/>
+                <a:gd name="connsiteX57" fmla="*/ 2668120 w 5535001"/>
+                <a:gd name="connsiteY57" fmla="*/ 6249344 h 6250127"/>
+                <a:gd name="connsiteX58" fmla="*/ 2630498 w 5535001"/>
+                <a:gd name="connsiteY58" fmla="*/ 6250127 h 6250127"/>
+                <a:gd name="connsiteX59" fmla="*/ 2592988 w 5535001"/>
+                <a:gd name="connsiteY59" fmla="*/ 6249568 h 6250127"/>
+                <a:gd name="connsiteX60" fmla="*/ 2518080 w 5535001"/>
+                <a:gd name="connsiteY60" fmla="*/ 6247777 h 6250127"/>
+                <a:gd name="connsiteX61" fmla="*/ 2442948 w 5535001"/>
+                <a:gd name="connsiteY61" fmla="*/ 6244529 h 6250127"/>
+                <a:gd name="connsiteX62" fmla="*/ 2291676 w 5535001"/>
+                <a:gd name="connsiteY62" fmla="*/ 6232213 h 6250127"/>
+                <a:gd name="connsiteX63" fmla="*/ 2141412 w 5535001"/>
+                <a:gd name="connsiteY63" fmla="*/ 6212394 h 6250127"/>
+                <a:gd name="connsiteX64" fmla="*/ 1992715 w 5535001"/>
+                <a:gd name="connsiteY64" fmla="*/ 6184961 h 6250127"/>
+                <a:gd name="connsiteX65" fmla="*/ 1845811 w 5535001"/>
+                <a:gd name="connsiteY65" fmla="*/ 6151034 h 6250127"/>
+                <a:gd name="connsiteX66" fmla="*/ 1701033 w 5535001"/>
+                <a:gd name="connsiteY66" fmla="*/ 6110724 h 6250127"/>
+                <a:gd name="connsiteX67" fmla="*/ 1629484 w 5535001"/>
+                <a:gd name="connsiteY67" fmla="*/ 6088219 h 6250127"/>
+                <a:gd name="connsiteX68" fmla="*/ 1558383 w 5535001"/>
+                <a:gd name="connsiteY68" fmla="*/ 6064929 h 6250127"/>
+                <a:gd name="connsiteX69" fmla="*/ 1011968 w 5535001"/>
+                <a:gd name="connsiteY69" fmla="*/ 5828896 h 6250127"/>
+                <a:gd name="connsiteX70" fmla="*/ 511237 w 5535001"/>
+                <a:gd name="connsiteY70" fmla="*/ 5512356 h 6250127"/>
+                <a:gd name="connsiteX71" fmla="*/ 395572 w 5535001"/>
+                <a:gd name="connsiteY71" fmla="*/ 5419757 h 6250127"/>
+                <a:gd name="connsiteX72" fmla="*/ 284722 w 5535001"/>
+                <a:gd name="connsiteY72" fmla="*/ 5321559 h 6250127"/>
+                <a:gd name="connsiteX73" fmla="*/ 257513 w 5535001"/>
+                <a:gd name="connsiteY73" fmla="*/ 5296477 h 6250127"/>
+                <a:gd name="connsiteX74" fmla="*/ 243853 w 5535001"/>
+                <a:gd name="connsiteY74" fmla="*/ 5283937 h 6250127"/>
+                <a:gd name="connsiteX75" fmla="*/ 230752 w 5535001"/>
+                <a:gd name="connsiteY75" fmla="*/ 5270836 h 6250127"/>
+                <a:gd name="connsiteX76" fmla="*/ 178574 w 5535001"/>
+                <a:gd name="connsiteY76" fmla="*/ 5218322 h 6250127"/>
+                <a:gd name="connsiteX77" fmla="*/ 126508 w 5535001"/>
+                <a:gd name="connsiteY77" fmla="*/ 5165584 h 6250127"/>
+                <a:gd name="connsiteX78" fmla="*/ 76345 w 5535001"/>
+                <a:gd name="connsiteY78" fmla="*/ 5111167 h 6250127"/>
+                <a:gd name="connsiteX79" fmla="*/ 26407 w 5535001"/>
+                <a:gd name="connsiteY79" fmla="*/ 5056413 h 6250127"/>
+                <a:gd name="connsiteX80" fmla="*/ 0 w 5535001"/>
+                <a:gd name="connsiteY80" fmla="*/ 5024776 h 6250127"/>
+                <a:gd name="connsiteX81" fmla="*/ 0 w 5535001"/>
+                <a:gd name="connsiteY81" fmla="*/ 4492798 h 6250127"/>
+                <a:gd name="connsiteX82" fmla="*/ 28534 w 5535001"/>
+                <a:gd name="connsiteY82" fmla="*/ 4537879 h 6250127"/>
+                <a:gd name="connsiteX83" fmla="*/ 66604 w 5535001"/>
+                <a:gd name="connsiteY83" fmla="*/ 4592745 h 6250127"/>
+                <a:gd name="connsiteX84" fmla="*/ 104114 w 5535001"/>
+                <a:gd name="connsiteY84" fmla="*/ 4647834 h 6250127"/>
+                <a:gd name="connsiteX85" fmla="*/ 143751 w 5535001"/>
+                <a:gd name="connsiteY85" fmla="*/ 4701580 h 6250127"/>
+                <a:gd name="connsiteX86" fmla="*/ 182717 w 5535001"/>
+                <a:gd name="connsiteY86" fmla="*/ 4755773 h 6250127"/>
+                <a:gd name="connsiteX87" fmla="*/ 223810 w 5535001"/>
+                <a:gd name="connsiteY87" fmla="*/ 4808399 h 6250127"/>
+                <a:gd name="connsiteX88" fmla="*/ 264679 w 5535001"/>
+                <a:gd name="connsiteY88" fmla="*/ 4861249 h 6250127"/>
+                <a:gd name="connsiteX89" fmla="*/ 307788 w 5535001"/>
+                <a:gd name="connsiteY89" fmla="*/ 4912420 h 6250127"/>
+                <a:gd name="connsiteX90" fmla="*/ 351232 w 5535001"/>
+                <a:gd name="connsiteY90" fmla="*/ 4963254 h 6250127"/>
+                <a:gd name="connsiteX91" fmla="*/ 397028 w 5535001"/>
+                <a:gd name="connsiteY91" fmla="*/ 5012185 h 6250127"/>
+                <a:gd name="connsiteX92" fmla="*/ 443496 w 5535001"/>
+                <a:gd name="connsiteY92" fmla="*/ 5060444 h 6250127"/>
+                <a:gd name="connsiteX93" fmla="*/ 455140 w 5535001"/>
+                <a:gd name="connsiteY93" fmla="*/ 5072537 h 6250127"/>
+                <a:gd name="connsiteX94" fmla="*/ 467345 w 5535001"/>
+                <a:gd name="connsiteY94" fmla="*/ 5083958 h 6250127"/>
+                <a:gd name="connsiteX95" fmla="*/ 491755 w 5535001"/>
+                <a:gd name="connsiteY95" fmla="*/ 5106912 h 6250127"/>
+                <a:gd name="connsiteX96" fmla="*/ 540686 w 5535001"/>
+                <a:gd name="connsiteY96" fmla="*/ 5152819 h 6250127"/>
+                <a:gd name="connsiteX97" fmla="*/ 552890 w 5535001"/>
+                <a:gd name="connsiteY97" fmla="*/ 5164353 h 6250127"/>
+                <a:gd name="connsiteX98" fmla="*/ 565655 w 5535001"/>
+                <a:gd name="connsiteY98" fmla="*/ 5175214 h 6250127"/>
+                <a:gd name="connsiteX99" fmla="*/ 591072 w 5535001"/>
+                <a:gd name="connsiteY99" fmla="*/ 5197048 h 6250127"/>
+                <a:gd name="connsiteX100" fmla="*/ 694197 w 5535001"/>
+                <a:gd name="connsiteY100" fmla="*/ 5283041 h 6250127"/>
+                <a:gd name="connsiteX101" fmla="*/ 1146221 w 5535001"/>
+                <a:gd name="connsiteY101" fmla="*/ 5573716 h 6250127"/>
+                <a:gd name="connsiteX102" fmla="*/ 1650982 w 5535001"/>
+                <a:gd name="connsiteY102" fmla="*/ 5758130 h 6250127"/>
+                <a:gd name="connsiteX103" fmla="*/ 1716485 w 5535001"/>
+                <a:gd name="connsiteY103" fmla="*/ 5772798 h 6250127"/>
+                <a:gd name="connsiteX104" fmla="*/ 1782211 w 5535001"/>
+                <a:gd name="connsiteY104" fmla="*/ 5786235 h 6250127"/>
+                <a:gd name="connsiteX105" fmla="*/ 1848386 w 5535001"/>
+                <a:gd name="connsiteY105" fmla="*/ 5796984 h 6250127"/>
+                <a:gd name="connsiteX106" fmla="*/ 1881417 w 5535001"/>
+                <a:gd name="connsiteY106" fmla="*/ 5802359 h 6250127"/>
+                <a:gd name="connsiteX107" fmla="*/ 1914560 w 5535001"/>
+                <a:gd name="connsiteY107" fmla="*/ 5807061 h 6250127"/>
+                <a:gd name="connsiteX108" fmla="*/ 2047469 w 5535001"/>
+                <a:gd name="connsiteY108" fmla="*/ 5821282 h 6250127"/>
+                <a:gd name="connsiteX109" fmla="*/ 2180601 w 5535001"/>
+                <a:gd name="connsiteY109" fmla="*/ 5828896 h 6250127"/>
+                <a:gd name="connsiteX110" fmla="*/ 2313622 w 5535001"/>
+                <a:gd name="connsiteY110" fmla="*/ 5830463 h 6250127"/>
+                <a:gd name="connsiteX111" fmla="*/ 2380021 w 5535001"/>
+                <a:gd name="connsiteY111" fmla="*/ 5828448 h 6250127"/>
+                <a:gd name="connsiteX112" fmla="*/ 2446195 w 5535001"/>
+                <a:gd name="connsiteY112" fmla="*/ 5826433 h 6250127"/>
+                <a:gd name="connsiteX113" fmla="*/ 2513041 w 5535001"/>
+                <a:gd name="connsiteY113" fmla="*/ 5822737 h 6250127"/>
+                <a:gd name="connsiteX114" fmla="*/ 2580111 w 5535001"/>
+                <a:gd name="connsiteY114" fmla="*/ 5818258 h 6250127"/>
+                <a:gd name="connsiteX115" fmla="*/ 2613590 w 5535001"/>
+                <a:gd name="connsiteY115" fmla="*/ 5816355 h 6250127"/>
+                <a:gd name="connsiteX116" fmla="*/ 2646845 w 5535001"/>
+                <a:gd name="connsiteY116" fmla="*/ 5813108 h 6250127"/>
+                <a:gd name="connsiteX117" fmla="*/ 2713244 w 5535001"/>
+                <a:gd name="connsiteY117" fmla="*/ 5806838 h 6250127"/>
+                <a:gd name="connsiteX118" fmla="*/ 3230882 w 5535001"/>
+                <a:gd name="connsiteY118" fmla="*/ 5721292 h 6250127"/>
+                <a:gd name="connsiteX119" fmla="*/ 3720416 w 5535001"/>
+                <a:gd name="connsiteY119" fmla="*/ 5556472 h 6250127"/>
+                <a:gd name="connsiteX120" fmla="*/ 3837425 w 5535001"/>
+                <a:gd name="connsiteY120" fmla="*/ 5499927 h 6250127"/>
+                <a:gd name="connsiteX121" fmla="*/ 3951634 w 5535001"/>
+                <a:gd name="connsiteY121" fmla="*/ 5436552 h 6250127"/>
+                <a:gd name="connsiteX122" fmla="*/ 4007284 w 5535001"/>
+                <a:gd name="connsiteY122" fmla="*/ 5401841 h 6250127"/>
+                <a:gd name="connsiteX123" fmla="*/ 4035164 w 5535001"/>
+                <a:gd name="connsiteY123" fmla="*/ 5384374 h 6250127"/>
+                <a:gd name="connsiteX124" fmla="*/ 4049049 w 5535001"/>
+                <a:gd name="connsiteY124" fmla="*/ 5375640 h 6250127"/>
+                <a:gd name="connsiteX125" fmla="*/ 4062485 w 5535001"/>
+                <a:gd name="connsiteY125" fmla="*/ 5366123 h 6250127"/>
+                <a:gd name="connsiteX126" fmla="*/ 4116567 w 5535001"/>
+                <a:gd name="connsiteY126" fmla="*/ 5328277 h 6250127"/>
+                <a:gd name="connsiteX127" fmla="*/ 4169976 w 5535001"/>
+                <a:gd name="connsiteY127" fmla="*/ 5289199 h 6250127"/>
+                <a:gd name="connsiteX128" fmla="*/ 4222042 w 5535001"/>
+                <a:gd name="connsiteY128" fmla="*/ 5247994 h 6250127"/>
+                <a:gd name="connsiteX129" fmla="*/ 4273213 w 5535001"/>
+                <a:gd name="connsiteY129" fmla="*/ 5205558 h 6250127"/>
+                <a:gd name="connsiteX130" fmla="*/ 4323151 w 5535001"/>
+                <a:gd name="connsiteY130" fmla="*/ 5161329 h 6250127"/>
+                <a:gd name="connsiteX131" fmla="*/ 4371971 w 5535001"/>
+                <a:gd name="connsiteY131" fmla="*/ 5116093 h 6250127"/>
+                <a:gd name="connsiteX132" fmla="*/ 4546868 w 5535001"/>
+                <a:gd name="connsiteY132" fmla="*/ 4924400 h 6250127"/>
+                <a:gd name="connsiteX133" fmla="*/ 4675634 w 5535001"/>
+                <a:gd name="connsiteY133" fmla="*/ 4715352 h 6250127"/>
+                <a:gd name="connsiteX134" fmla="*/ 4700155 w 5535001"/>
+                <a:gd name="connsiteY134" fmla="*/ 4659255 h 6250127"/>
+                <a:gd name="connsiteX135" fmla="*/ 4721206 w 5535001"/>
+                <a:gd name="connsiteY135" fmla="*/ 4600135 h 6250127"/>
+                <a:gd name="connsiteX136" fmla="*/ 4740465 w 5535001"/>
+                <a:gd name="connsiteY136" fmla="*/ 4538887 h 6250127"/>
+                <a:gd name="connsiteX137" fmla="*/ 4758492 w 5535001"/>
+                <a:gd name="connsiteY137" fmla="*/ 4475848 h 6250127"/>
+                <a:gd name="connsiteX138" fmla="*/ 4891288 w 5535001"/>
+                <a:gd name="connsiteY138" fmla="*/ 3930329 h 6250127"/>
+                <a:gd name="connsiteX139" fmla="*/ 5066298 w 5535001"/>
+                <a:gd name="connsiteY139" fmla="*/ 3382235 h 6250127"/>
+                <a:gd name="connsiteX140" fmla="*/ 5156994 w 5535001"/>
+                <a:gd name="connsiteY140" fmla="*/ 2898635 h 6250127"/>
+                <a:gd name="connsiteX141" fmla="*/ 5083317 w 5535001"/>
+                <a:gd name="connsiteY141" fmla="*/ 2402047 h 6250127"/>
+                <a:gd name="connsiteX142" fmla="*/ 4871022 w 5535001"/>
+                <a:gd name="connsiteY142" fmla="*/ 1926958 h 6250127"/>
+                <a:gd name="connsiteX143" fmla="*/ 4727028 w 5535001"/>
+                <a:gd name="connsiteY143" fmla="*/ 1703577 h 6250127"/>
+                <a:gd name="connsiteX144" fmla="*/ 4563776 w 5535001"/>
+                <a:gd name="connsiteY144" fmla="*/ 1490834 h 6250127"/>
+                <a:gd name="connsiteX145" fmla="*/ 4370291 w 5535001"/>
+                <a:gd name="connsiteY145" fmla="*/ 1300596 h 6250127"/>
+                <a:gd name="connsiteX146" fmla="*/ 4266046 w 5535001"/>
+                <a:gd name="connsiteY146" fmla="*/ 1214491 h 6250127"/>
+                <a:gd name="connsiteX147" fmla="*/ 4212973 w 5535001"/>
+                <a:gd name="connsiteY147" fmla="*/ 1173062 h 6250127"/>
+                <a:gd name="connsiteX148" fmla="*/ 4157995 w 5535001"/>
+                <a:gd name="connsiteY148" fmla="*/ 1134545 h 6250127"/>
+                <a:gd name="connsiteX149" fmla="*/ 3697126 w 5535001"/>
+                <a:gd name="connsiteY149" fmla="*/ 881044 h 6250127"/>
+                <a:gd name="connsiteX150" fmla="*/ 3637670 w 5535001"/>
+                <a:gd name="connsiteY150" fmla="*/ 856747 h 6250127"/>
+                <a:gd name="connsiteX151" fmla="*/ 3608222 w 5535001"/>
+                <a:gd name="connsiteY151" fmla="*/ 844318 h 6250127"/>
+                <a:gd name="connsiteX152" fmla="*/ 3578214 w 5535001"/>
+                <a:gd name="connsiteY152" fmla="*/ 833457 h 6250127"/>
+                <a:gd name="connsiteX153" fmla="*/ 3518309 w 5535001"/>
+                <a:gd name="connsiteY153" fmla="*/ 812294 h 6250127"/>
+                <a:gd name="connsiteX154" fmla="*/ 3503417 w 5535001"/>
+                <a:gd name="connsiteY154" fmla="*/ 806920 h 6250127"/>
+                <a:gd name="connsiteX155" fmla="*/ 3489533 w 5535001"/>
+                <a:gd name="connsiteY155" fmla="*/ 799642 h 6250127"/>
+                <a:gd name="connsiteX156" fmla="*/ 3460869 w 5535001"/>
+                <a:gd name="connsiteY156" fmla="*/ 787101 h 6250127"/>
+                <a:gd name="connsiteX157" fmla="*/ 3402980 w 5535001"/>
+                <a:gd name="connsiteY157" fmla="*/ 763475 h 6250127"/>
+                <a:gd name="connsiteX158" fmla="*/ 3374092 w 5535001"/>
+                <a:gd name="connsiteY158" fmla="*/ 751606 h 6250127"/>
+                <a:gd name="connsiteX159" fmla="*/ 3344980 w 5535001"/>
+                <a:gd name="connsiteY159" fmla="*/ 740409 h 6250127"/>
+                <a:gd name="connsiteX160" fmla="*/ 3226627 w 5535001"/>
+                <a:gd name="connsiteY160" fmla="*/ 700772 h 6250127"/>
+                <a:gd name="connsiteX161" fmla="*/ 2735750 w 5535001"/>
+                <a:gd name="connsiteY161" fmla="*/ 614667 h 6250127"/>
+                <a:gd name="connsiteX162" fmla="*/ 2673158 w 5535001"/>
+                <a:gd name="connsiteY162" fmla="*/ 610412 h 6250127"/>
+                <a:gd name="connsiteX163" fmla="*/ 2610119 w 5535001"/>
+                <a:gd name="connsiteY163" fmla="*/ 609628 h 6250127"/>
+                <a:gd name="connsiteX164" fmla="*/ 2547080 w 5535001"/>
+                <a:gd name="connsiteY164" fmla="*/ 608620 h 6250127"/>
+                <a:gd name="connsiteX165" fmla="*/ 2516400 w 5535001"/>
+                <a:gd name="connsiteY165" fmla="*/ 608844 h 6250127"/>
+                <a:gd name="connsiteX166" fmla="*/ 2486280 w 5535001"/>
+                <a:gd name="connsiteY166" fmla="*/ 609740 h 6250127"/>
+                <a:gd name="connsiteX167" fmla="*/ 2426376 w 5535001"/>
+                <a:gd name="connsiteY167" fmla="*/ 613099 h 6250127"/>
+                <a:gd name="connsiteX168" fmla="*/ 2366920 w 5535001"/>
+                <a:gd name="connsiteY168" fmla="*/ 618474 h 6250127"/>
+                <a:gd name="connsiteX169" fmla="*/ 2337248 w 5535001"/>
+                <a:gd name="connsiteY169" fmla="*/ 621497 h 6250127"/>
+                <a:gd name="connsiteX170" fmla="*/ 2307800 w 5535001"/>
+                <a:gd name="connsiteY170" fmla="*/ 625528 h 6250127"/>
+                <a:gd name="connsiteX171" fmla="*/ 2278351 w 5535001"/>
+                <a:gd name="connsiteY171" fmla="*/ 629559 h 6250127"/>
+                <a:gd name="connsiteX172" fmla="*/ 2249127 w 5535001"/>
+                <a:gd name="connsiteY172" fmla="*/ 634710 h 6250127"/>
+                <a:gd name="connsiteX173" fmla="*/ 1796096 w 5535001"/>
+                <a:gd name="connsiteY173" fmla="*/ 781726 h 6250127"/>
+                <a:gd name="connsiteX174" fmla="*/ 1370833 w 5535001"/>
+                <a:gd name="connsiteY174" fmla="*/ 1048663 h 6250127"/>
+                <a:gd name="connsiteX175" fmla="*/ 959790 w 5535001"/>
+                <a:gd name="connsiteY175" fmla="*/ 1390844 h 6250127"/>
+                <a:gd name="connsiteX176" fmla="*/ 749062 w 5535001"/>
+                <a:gd name="connsiteY176" fmla="*/ 1577611 h 6250127"/>
+                <a:gd name="connsiteX177" fmla="*/ 524786 w 5535001"/>
+                <a:gd name="connsiteY177" fmla="*/ 1763145 h 6250127"/>
+                <a:gd name="connsiteX178" fmla="*/ 84071 w 5535001"/>
+                <a:gd name="connsiteY178" fmla="*/ 2098496 h 6250127"/>
+                <a:gd name="connsiteX179" fmla="*/ 0 w 5535001"/>
+                <a:gd name="connsiteY179" fmla="*/ 2168094 h 6250127"/>
+                <a:gd name="connsiteX180" fmla="*/ 0 w 5535001"/>
+                <a:gd name="connsiteY180" fmla="*/ 1576676 h 6250127"/>
+                <a:gd name="connsiteX181" fmla="*/ 174655 w 5535001"/>
+                <a:gd name="connsiteY181" fmla="*/ 1387597 h 6250127"/>
+                <a:gd name="connsiteX182" fmla="*/ 363661 w 5535001"/>
+                <a:gd name="connsiteY182" fmla="*/ 1188626 h 6250127"/>
+                <a:gd name="connsiteX183" fmla="*/ 458052 w 5535001"/>
+                <a:gd name="connsiteY183" fmla="*/ 1086397 h 6250127"/>
+                <a:gd name="connsiteX184" fmla="*/ 557257 w 5535001"/>
+                <a:gd name="connsiteY184" fmla="*/ 981593 h 6250127"/>
+                <a:gd name="connsiteX185" fmla="*/ 994165 w 5535001"/>
+                <a:gd name="connsiteY185" fmla="*/ 578389 h 6250127"/>
+                <a:gd name="connsiteX186" fmla="*/ 1520873 w 5535001"/>
+                <a:gd name="connsiteY186" fmla="*/ 237215 h 6250127"/>
+                <a:gd name="connsiteX187" fmla="*/ 2141748 w 5535001"/>
+                <a:gd name="connsiteY187" fmla="*/ 31190 h 6250127"/>
+                <a:gd name="connsiteX188" fmla="*/ 2182505 w 5535001"/>
+                <a:gd name="connsiteY188" fmla="*/ 24360 h 6250127"/>
+                <a:gd name="connsiteX189" fmla="*/ 2223374 w 5535001"/>
+                <a:gd name="connsiteY189" fmla="*/ 18873 h 6250127"/>
+                <a:gd name="connsiteX190" fmla="*/ 2264355 w 5535001"/>
+                <a:gd name="connsiteY190" fmla="*/ 13611 h 6250127"/>
+                <a:gd name="connsiteX191" fmla="*/ 2305336 w 5535001"/>
+                <a:gd name="connsiteY191" fmla="*/ 9580 h 6250127"/>
+                <a:gd name="connsiteX192" fmla="*/ 2387410 w 5535001"/>
+                <a:gd name="connsiteY192" fmla="*/ 3645 h 6250127"/>
+                <a:gd name="connsiteX193" fmla="*/ 2469373 w 5535001"/>
+                <a:gd name="connsiteY193" fmla="*/ 622 h 6250127"/>
+              </a:gdLst>
+              <a:ahLst/>
+              <a:cxnLst>
+                <a:cxn ang="0">
+                  <a:pos x="connsiteX0" y="connsiteY0"/>
+                </a:cxn>
+                <a:cxn ang="0">
+                  <a:pos x="connsiteX1" y="connsiteY1"/>
+                </a:cxn>
+                <a:cxn ang="0">
+                  <a:pos x="connsiteX2" y="connsiteY2"/>
+                </a:cxn>
+                <a:cxn ang="0">
+                  <a:pos x="connsiteX3" y="connsiteY3"/>
+                </a:cxn>
+                <a:cxn ang="0">
+                  <a:pos x="connsiteX4" y="connsiteY4"/>
+                </a:cxn>
+                <a:cxn ang="0">
+                  <a:pos x="connsiteX5" y="connsiteY5"/>
+                </a:cxn>
+                <a:cxn ang="0">
+                  <a:pos x="connsiteX6" y="connsiteY6"/>
+                </a:cxn>
+                <a:cxn ang="0">
+                  <a:pos x="connsiteX7" y="connsiteY7"/>
+                </a:cxn>
+                <a:cxn ang="0">
+                  <a:pos x="connsiteX8" y="connsiteY8"/>
+                </a:cxn>
+                <a:cxn ang="0">
+                  <a:pos x="connsiteX9" y="connsiteY9"/>
+                </a:cxn>
+                <a:cxn ang="0">
+                  <a:pos x="connsiteX10" y="connsiteY10"/>
+                </a:cxn>
+                <a:cxn ang="0">
+                  <a:pos x="connsiteX11" y="connsiteY11"/>
+                </a:cxn>
+                <a:cxn ang="0">
+                  <a:pos x="connsiteX12" y="connsiteY12"/>
+                </a:cxn>
+                <a:cxn ang="0">
+                  <a:pos x="connsiteX13" y="connsiteY13"/>
+                </a:cxn>
+                <a:cxn ang="0">
+                  <a:pos x="connsiteX14" y="connsiteY14"/>
+                </a:cxn>
+                <a:cxn ang="0">
+                  <a:pos x="connsiteX15" y="connsiteY15"/>
+                </a:cxn>
+                <a:cxn ang="0">
+                  <a:pos x="connsiteX16" y="connsiteY16"/>
+                </a:cxn>
+                <a:cxn ang="0">
+                  <a:pos x="connsiteX17" y="connsiteY17"/>
+                </a:cxn>
+                <a:cxn ang="0">
+                  <a:pos x="connsiteX18" y="connsiteY18"/>
+                </a:cxn>
+                <a:cxn ang="0">
+                  <a:pos x="connsiteX19" y="connsiteY19"/>
+                </a:cxn>
+                <a:cxn ang="0">
+                  <a:pos x="connsiteX20" y="connsiteY20"/>
+                </a:cxn>
+                <a:cxn ang="0">
+                  <a:pos x="connsiteX21" y="connsiteY21"/>
+                </a:cxn>
+                <a:cxn ang="0">
+                  <a:pos x="connsiteX22" y="connsiteY22"/>
+                </a:cxn>
+                <a:cxn ang="0">
+                  <a:pos x="connsiteX23" y="connsiteY23"/>
+                </a:cxn>
+                <a:cxn ang="0">
+                  <a:pos x="connsiteX24" y="connsiteY24"/>
+                </a:cxn>
+                <a:cxn ang="0">
+                  <a:pos x="connsiteX25" y="connsiteY25"/>
+                </a:cxn>
+                <a:cxn ang="0">
+                  <a:pos x="connsiteX26" y="connsiteY26"/>
+                </a:cxn>
+                <a:cxn ang="0">
+                  <a:pos x="connsiteX27" y="connsiteY27"/>
+                </a:cxn>
+                <a:cxn ang="0">
+                  <a:pos x="connsiteX28" y="connsiteY28"/>
+                </a:cxn>
+                <a:cxn ang="0">
+                  <a:pos x="connsiteX29" y="connsiteY29"/>
+                </a:cxn>
+                <a:cxn ang="0">
+                  <a:pos x="connsiteX30" y="connsiteY30"/>
+                </a:cxn>
+                <a:cxn ang="0">
+                  <a:pos x="connsiteX31" y="connsiteY31"/>
+                </a:cxn>
+                <a:cxn ang="0">
+                  <a:pos x="connsiteX32" y="connsiteY32"/>
+                </a:cxn>
+                <a:cxn ang="0">
+                  <a:pos x="connsiteX33" y="connsiteY33"/>
+                </a:cxn>
+                <a:cxn ang="0">
+                  <a:pos x="connsiteX34" y="connsiteY34"/>
+                </a:cxn>
+                <a:cxn ang="0">
+                  <a:pos x="connsiteX35" y="connsiteY35"/>
+                </a:cxn>
+                <a:cxn ang="0">
+                  <a:pos x="connsiteX36" y="connsiteY36"/>
+                </a:cxn>
+                <a:cxn ang="0">
+                  <a:pos x="connsiteX37" y="connsiteY37"/>
+                </a:cxn>
+                <a:cxn ang="0">
+                  <a:pos x="connsiteX38" y="connsiteY38"/>
+                </a:cxn>
+                <a:cxn ang="0">
+                  <a:pos x="connsiteX39" y="connsiteY39"/>
+                </a:cxn>
+                <a:cxn ang="0">
+                  <a:pos x="connsiteX40" y="connsiteY40"/>
+                </a:cxn>
+                <a:cxn ang="0">
+                  <a:pos x="connsiteX41" y="connsiteY41"/>
+                </a:cxn>
+                <a:cxn ang="0">
+                  <a:pos x="connsiteX42" y="connsiteY42"/>
+                </a:cxn>
+                <a:cxn ang="0">
+                  <a:pos x="connsiteX43" y="connsiteY43"/>
+                </a:cxn>
+                <a:cxn ang="0">
+                  <a:pos x="connsiteX44" y="connsiteY44"/>
+                </a:cxn>
+                <a:cxn ang="0">
+                  <a:pos x="connsiteX45" y="connsiteY45"/>
+                </a:cxn>
+                <a:cxn ang="0">
+                  <a:pos x="connsiteX46" y="connsiteY46"/>
+                </a:cxn>
+                <a:cxn ang="0">
+                  <a:pos x="connsiteX47" y="connsiteY47"/>
+                </a:cxn>
+                <a:cxn ang="0">
+                  <a:pos x="connsiteX48" y="connsiteY48"/>
+                </a:cxn>
+                <a:cxn ang="0">
+                  <a:pos x="connsiteX49" y="connsiteY49"/>
+                </a:cxn>
+                <a:cxn ang="0">
+                  <a:pos x="connsiteX50" y="connsiteY50"/>
+                </a:cxn>
+                <a:cxn ang="0">
+                  <a:pos x="connsiteX51" y="connsiteY51"/>
+                </a:cxn>
+                <a:cxn ang="0">
+                  <a:pos x="connsiteX52" y="connsiteY52"/>
+                </a:cxn>
+                <a:cxn ang="0">
+                  <a:pos x="connsiteX53" y="connsiteY53"/>
+                </a:cxn>
+                <a:cxn ang="0">
+                  <a:pos x="connsiteX54" y="connsiteY54"/>
+                </a:cxn>
+                <a:cxn ang="0">
+                  <a:pos x="connsiteX55" y="connsiteY55"/>
+                </a:cxn>
+                <a:cxn ang="0">
+                  <a:pos x="connsiteX56" y="connsiteY56"/>
+                </a:cxn>
+                <a:cxn ang="0">
+                  <a:pos x="connsiteX57" y="connsiteY57"/>
+                </a:cxn>
+                <a:cxn ang="0">
+                  <a:pos x="connsiteX58" y="connsiteY58"/>
+                </a:cxn>
+                <a:cxn ang="0">
+                  <a:pos x="connsiteX59" y="connsiteY59"/>
+                </a:cxn>
+                <a:cxn ang="0">
+                  <a:pos x="connsiteX60" y="connsiteY60"/>
+                </a:cxn>
+                <a:cxn ang="0">
+                  <a:pos x="connsiteX61" y="connsiteY61"/>
+                </a:cxn>
+                <a:cxn ang="0">
+                  <a:pos x="connsiteX62" y="connsiteY62"/>
+                </a:cxn>
+                <a:cxn ang="0">
+                  <a:pos x="connsiteX63" y="connsiteY63"/>
+                </a:cxn>
+                <a:cxn ang="0">
+                  <a:pos x="connsiteX64" y="connsiteY64"/>
+                </a:cxn>
+                <a:cxn ang="0">
+                  <a:pos x="connsiteX65" y="connsiteY65"/>
+                </a:cxn>
+                <a:cxn ang="0">
+                  <a:pos x="connsiteX66" y="connsiteY66"/>
+                </a:cxn>
+                <a:cxn ang="0">
+                  <a:pos x="connsiteX67" y="connsiteY67"/>
+                </a:cxn>
+                <a:cxn ang="0">
+                  <a:pos x="connsiteX68" y="connsiteY68"/>
+                </a:cxn>
+                <a:cxn ang="0">
+                  <a:pos x="connsiteX69" y="connsiteY69"/>
+                </a:cxn>
+                <a:cxn ang="0">
+                  <a:pos x="connsiteX70" y="connsiteY70"/>
+                </a:cxn>
+                <a:cxn ang="0">
+                  <a:pos x="connsiteX71" y="connsiteY71"/>
+                </a:cxn>
+                <a:cxn ang="0">
+                  <a:pos x="connsiteX72" y="connsiteY72"/>
+                </a:cxn>
+                <a:cxn ang="0">
+                  <a:pos x="connsiteX73" y="connsiteY73"/>
+                </a:cxn>
+                <a:cxn ang="0">
+                  <a:pos x="connsiteX74" y="connsiteY74"/>
+                </a:cxn>
+                <a:cxn ang="0">
+                  <a:pos x="connsiteX75" y="connsiteY75"/>
+                </a:cxn>
+                <a:cxn ang="0">
+                  <a:pos x="connsiteX76" y="connsiteY76"/>
+                </a:cxn>
+                <a:cxn ang="0">
+                  <a:pos x="connsiteX77" y="connsiteY77"/>
+                </a:cxn>
+                <a:cxn ang="0">
+                  <a:pos x="connsiteX78" y="connsiteY78"/>
+                </a:cxn>
+                <a:cxn ang="0">
+                  <a:pos x="connsiteX79" y="connsiteY79"/>
+                </a:cxn>
+                <a:cxn ang="0">
+                  <a:pos x="connsiteX80" y="connsiteY80"/>
+                </a:cxn>
+                <a:cxn ang="0">
+                  <a:pos x="connsiteX81" y="connsiteY81"/>
+                </a:cxn>
+                <a:cxn ang="0">
+                  <a:pos x="connsiteX82" y="connsiteY82"/>
+                </a:cxn>
+                <a:cxn ang="0">
+                  <a:pos x="connsiteX83" y="connsiteY83"/>
+                </a:cxn>
+                <a:cxn ang="0">
+                  <a:pos x="connsiteX84" y="connsiteY84"/>
+                </a:cxn>
+                <a:cxn ang="0">
+                  <a:pos x="connsiteX85" y="connsiteY85"/>
+                </a:cxn>
+                <a:cxn ang="0">
+                  <a:pos x="connsiteX86" y="connsiteY86"/>
+                </a:cxn>
+                <a:cxn ang="0">
+                  <a:pos x="connsiteX87" y="connsiteY87"/>
+                </a:cxn>
+                <a:cxn ang="0">
+                  <a:pos x="connsiteX88" y="connsiteY88"/>
+                </a:cxn>
+                <a:cxn ang="0">
+                  <a:pos x="connsiteX89" y="connsiteY89"/>
+                </a:cxn>
+                <a:cxn ang="0">
+                  <a:pos x="connsiteX90" y="connsiteY90"/>
+                </a:cxn>
+                <a:cxn ang="0">
+                  <a:pos x="connsiteX91" y="connsiteY91"/>
+                </a:cxn>
+                <a:cxn ang="0">
+                  <a:pos x="connsiteX92" y="connsiteY92"/>
+                </a:cxn>
+                <a:cxn ang="0">
+                  <a:pos x="connsiteX93" y="connsiteY93"/>
+                </a:cxn>
+                <a:cxn ang="0">
+                  <a:pos x="connsiteX94" y="connsiteY94"/>
+                </a:cxn>
+                <a:cxn ang="0">
+                  <a:pos x="connsiteX95" y="connsiteY95"/>
+                </a:cxn>
+                <a:cxn ang="0">
+                  <a:pos x="connsiteX96" y="connsiteY96"/>
+                </a:cxn>
+                <a:cxn ang="0">
+                  <a:pos x="connsiteX97" y="connsiteY97"/>
+                </a:cxn>
+                <a:cxn ang="0">
+                  <a:pos x="connsiteX98" y="connsiteY98"/>
+                </a:cxn>
+                <a:cxn ang="0">
+                  <a:pos x="connsiteX99" y="connsiteY99"/>
+                </a:cxn>
+                <a:cxn ang="0">
+                  <a:pos x="connsiteX100" y="connsiteY100"/>
+                </a:cxn>
+                <a:cxn ang="0">
+                  <a:pos x="connsiteX101" y="connsiteY101"/>
+                </a:cxn>
+                <a:cxn ang="0">
+                  <a:pos x="connsiteX102" y="connsiteY102"/>
+                </a:cxn>
+                <a:cxn ang="0">
+                  <a:pos x="connsiteX103" y="connsiteY103"/>
+                </a:cxn>
+                <a:cxn ang="0">
+                  <a:pos x="connsiteX104" y="connsiteY104"/>
+                </a:cxn>
+                <a:cxn ang="0">
+                  <a:pos x="connsiteX105" y="connsiteY105"/>
+                </a:cxn>
+                <a:cxn ang="0">
+                  <a:pos x="connsiteX106" y="connsiteY106"/>
+                </a:cxn>
+                <a:cxn ang="0">
+                  <a:pos x="connsiteX107" y="connsiteY107"/>
+                </a:cxn>
+                <a:cxn ang="0">
+                  <a:pos x="connsiteX108" y="connsiteY108"/>
+                </a:cxn>
+                <a:cxn ang="0">
+                  <a:pos x="connsiteX109" y="connsiteY109"/>
+                </a:cxn>
+                <a:cxn ang="0">
+                  <a:pos x="connsiteX110" y="connsiteY110"/>
+                </a:cxn>
+                <a:cxn ang="0">
+                  <a:pos x="connsiteX111" y="connsiteY111"/>
+                </a:cxn>
+                <a:cxn ang="0">
+                  <a:pos x="connsiteX112" y="connsiteY112"/>
+                </a:cxn>
+                <a:cxn ang="0">
+                  <a:pos x="connsiteX113" y="connsiteY113"/>
+                </a:cxn>
+                <a:cxn ang="0">
+                  <a:pos x="connsiteX114" y="connsiteY114"/>
+                </a:cxn>
+                <a:cxn ang="0">
+                  <a:pos x="connsiteX115" y="connsiteY115"/>
+                </a:cxn>
+                <a:cxn ang="0">
+                  <a:pos x="connsiteX116" y="connsiteY116"/>
+                </a:cxn>
+                <a:cxn ang="0">
+                  <a:pos x="connsiteX117" y="connsiteY117"/>
+                </a:cxn>
+                <a:cxn ang="0">
+                  <a:pos x="connsiteX118" y="connsiteY118"/>
+                </a:cxn>
+                <a:cxn ang="0">
+                  <a:pos x="connsiteX119" y="connsiteY119"/>
+                </a:cxn>
+                <a:cxn ang="0">
+                  <a:pos x="connsiteX120" y="connsiteY120"/>
+                </a:cxn>
+                <a:cxn ang="0">
+                  <a:pos x="connsiteX121" y="connsiteY121"/>
+                </a:cxn>
+                <a:cxn ang="0">
+                  <a:pos x="connsiteX122" y="connsiteY122"/>
+                </a:cxn>
+                <a:cxn ang="0">
+                  <a:pos x="connsiteX123" y="connsiteY123"/>
+                </a:cxn>
+                <a:cxn ang="0">
+                  <a:pos x="connsiteX124" y="connsiteY124"/>
+                </a:cxn>
+                <a:cxn ang="0">
+                  <a:pos x="connsiteX125" y="connsiteY125"/>
+                </a:cxn>
+                <a:cxn ang="0">
+                  <a:pos x="connsiteX126" y="connsiteY126"/>
+                </a:cxn>
+                <a:cxn ang="0">
+                  <a:pos x="connsiteX127" y="connsiteY127"/>
+                </a:cxn>
+                <a:cxn ang="0">
+                  <a:pos x="connsiteX128" y="connsiteY128"/>
+                </a:cxn>
+                <a:cxn ang="0">
+                  <a:pos x="connsiteX129" y="connsiteY129"/>
+                </a:cxn>
+                <a:cxn ang="0">
+                  <a:pos x="connsiteX130" y="connsiteY130"/>
+                </a:cxn>
+                <a:cxn ang="0">
+                  <a:pos x="connsiteX131" y="connsiteY131"/>
+                </a:cxn>
+                <a:cxn ang="0">
+                  <a:pos x="connsiteX132" y="connsiteY132"/>
+                </a:cxn>
+                <a:cxn ang="0">
+                  <a:pos x="connsiteX133" y="connsiteY133"/>
+                </a:cxn>
+                <a:cxn ang="0">
+                  <a:pos x="connsiteX134" y="connsiteY134"/>
+                </a:cxn>
+                <a:cxn ang="0">
+                  <a:pos x="connsiteX135" y="connsiteY135"/>
+                </a:cxn>
+                <a:cxn ang="0">
+                  <a:pos x="connsiteX136" y="connsiteY136"/>
+                </a:cxn>
+                <a:cxn ang="0">
+                  <a:pos x="connsiteX137" y="connsiteY137"/>
+                </a:cxn>
+                <a:cxn ang="0">
+                  <a:pos x="connsiteX138" y="connsiteY138"/>
+                </a:cxn>
+                <a:cxn ang="0">
+                  <a:pos x="connsiteX139" y="connsiteY139"/>
+                </a:cxn>
+                <a:cxn ang="0">
+                  <a:pos x="connsiteX140" y="connsiteY140"/>
+                </a:cxn>
+                <a:cxn ang="0">
+                  <a:pos x="connsiteX141" y="connsiteY141"/>
+                </a:cxn>
+                <a:cxn ang="0">
+                  <a:pos x="connsiteX142" y="connsiteY142"/>
+                </a:cxn>
+                <a:cxn ang="0">
+                  <a:pos x="connsiteX143" y="connsiteY143"/>
+                </a:cxn>
+                <a:cxn ang="0">
+                  <a:pos x="connsiteX144" y="connsiteY144"/>
+                </a:cxn>
+                <a:cxn ang="0">
+                  <a:pos x="connsiteX145" y="connsiteY145"/>
+                </a:cxn>
+                <a:cxn ang="0">
+                  <a:pos x="connsiteX146" y="connsiteY146"/>
+                </a:cxn>
+                <a:cxn ang="0">
+                  <a:pos x="connsiteX147" y="connsiteY147"/>
+                </a:cxn>
+                <a:cxn ang="0">
+                  <a:pos x="connsiteX148" y="connsiteY148"/>
+                </a:cxn>
+                <a:cxn ang="0">
+                  <a:pos x="connsiteX149" y="connsiteY149"/>
+                </a:cxn>
+                <a:cxn ang="0">
+                  <a:pos x="connsiteX150" y="connsiteY150"/>
+                </a:cxn>
+                <a:cxn ang="0">
+                  <a:pos x="connsiteX151" y="connsiteY151"/>
+                </a:cxn>
+                <a:cxn ang="0">
+                  <a:pos x="connsiteX152" y="connsiteY152"/>
+                </a:cxn>
+                <a:cxn ang="0">
+                  <a:pos x="connsiteX153" y="connsiteY153"/>
+                </a:cxn>
+                <a:cxn ang="0">
+                  <a:pos x="connsiteX154" y="connsiteY154"/>
+                </a:cxn>
+                <a:cxn ang="0">
+                  <a:pos x="connsiteX155" y="connsiteY155"/>
+                </a:cxn>
+                <a:cxn ang="0">
+                  <a:pos x="connsiteX156" y="connsiteY156"/>
+                </a:cxn>
+                <a:cxn ang="0">
+                  <a:pos x="connsiteX157" y="connsiteY157"/>
+                </a:cxn>
+                <a:cxn ang="0">
+                  <a:pos x="connsiteX158" y="connsiteY158"/>
+                </a:cxn>
+                <a:cxn ang="0">
+                  <a:pos x="connsiteX159" y="connsiteY159"/>
+                </a:cxn>
+                <a:cxn ang="0">
+                  <a:pos x="connsiteX160" y="connsiteY160"/>
+                </a:cxn>
+                <a:cxn ang="0">
+                  <a:pos x="connsiteX161" y="connsiteY161"/>
+                </a:cxn>
+                <a:cxn ang="0">
+                  <a:pos x="connsiteX162" y="connsiteY162"/>
+                </a:cxn>
+                <a:cxn ang="0">
+                  <a:pos x="connsiteX163" y="connsiteY163"/>
+                </a:cxn>
+                <a:cxn ang="0">
+                  <a:pos x="connsiteX164" y="connsiteY164"/>
+                </a:cxn>
+                <a:cxn ang="0">
+                  <a:pos x="connsiteX165" y="connsiteY165"/>
+                </a:cxn>
+                <a:cxn ang="0">
+                  <a:pos x="connsiteX166" y="connsiteY166"/>
+                </a:cxn>
+                <a:cxn ang="0">
+                  <a:pos x="connsiteX167" y="connsiteY167"/>
+                </a:cxn>
+                <a:cxn ang="0">
+                  <a:pos x="connsiteX168" y="connsiteY168"/>
+                </a:cxn>
+                <a:cxn ang="0">
+                  <a:pos x="connsiteX169" y="connsiteY169"/>
+                </a:cxn>
+                <a:cxn ang="0">
+                  <a:pos x="connsiteX170" y="connsiteY170"/>
+                </a:cxn>
+                <a:cxn ang="0">
+                  <a:pos x="connsiteX171" y="connsiteY171"/>
+                </a:cxn>
+                <a:cxn ang="0">
+                  <a:pos x="connsiteX172" y="connsiteY172"/>
+                </a:cxn>
+                <a:cxn ang="0">
+                  <a:pos x="connsiteX173" y="connsiteY173"/>
+                </a:cxn>
+                <a:cxn ang="0">
+                  <a:pos x="connsiteX174" y="connsiteY174"/>
+                </a:cxn>
+                <a:cxn ang="0">
+                  <a:pos x="connsiteX175" y="connsiteY175"/>
+                </a:cxn>
+                <a:cxn ang="0">
+                  <a:pos x="connsiteX176" y="connsiteY176"/>
+                </a:cxn>
+                <a:cxn ang="0">
+                  <a:pos x="connsiteX177" y="connsiteY177"/>
+                </a:cxn>
+                <a:cxn ang="0">
+                  <a:pos x="connsiteX178" y="connsiteY178"/>
+                </a:cxn>
+                <a:cxn ang="0">
+                  <a:pos x="connsiteX179" y="connsiteY179"/>
+                </a:cxn>
+                <a:cxn ang="0">
+                  <a:pos x="connsiteX180" y="connsiteY180"/>
+                </a:cxn>
+                <a:cxn ang="0">
+                  <a:pos x="connsiteX181" y="connsiteY181"/>
+                </a:cxn>
+                <a:cxn ang="0">
+                  <a:pos x="connsiteX182" y="connsiteY182"/>
+                </a:cxn>
+                <a:cxn ang="0">
+                  <a:pos x="connsiteX183" y="connsiteY183"/>
+                </a:cxn>
+                <a:cxn ang="0">
+                  <a:pos x="connsiteX184" y="connsiteY184"/>
+                </a:cxn>
+                <a:cxn ang="0">
+                  <a:pos x="connsiteX185" y="connsiteY185"/>
+                </a:cxn>
+                <a:cxn ang="0">
+                  <a:pos x="connsiteX186" y="connsiteY186"/>
+                </a:cxn>
+                <a:cxn ang="0">
+                  <a:pos x="connsiteX187" y="connsiteY187"/>
+                </a:cxn>
+                <a:cxn ang="0">
+                  <a:pos x="connsiteX188" y="connsiteY188"/>
+                </a:cxn>
+                <a:cxn ang="0">
+                  <a:pos x="connsiteX189" y="connsiteY189"/>
+                </a:cxn>
+                <a:cxn ang="0">
+                  <a:pos x="connsiteX190" y="connsiteY190"/>
+                </a:cxn>
+                <a:cxn ang="0">
+                  <a:pos x="connsiteX191" y="connsiteY191"/>
+                </a:cxn>
+                <a:cxn ang="0">
+                  <a:pos x="connsiteX192" y="connsiteY192"/>
+                </a:cxn>
+                <a:cxn ang="0">
+                  <a:pos x="connsiteX193" y="connsiteY193"/>
+                </a:cxn>
+              </a:cxnLst>
+              <a:rect l="l" t="t" r="r" b="b"/>
+              <a:pathLst>
+                <a:path w="5535001" h="6250127">
+                  <a:moveTo>
+                    <a:pt x="2510242" y="174"/>
+                  </a:moveTo>
+                  <a:cubicBezTo>
+                    <a:pt x="2523902" y="-50"/>
+                    <a:pt x="2537562" y="-162"/>
+                    <a:pt x="2550551" y="510"/>
+                  </a:cubicBezTo>
+                  <a:lnTo>
+                    <a:pt x="2629490" y="3757"/>
+                  </a:lnTo>
+                  <a:lnTo>
+                    <a:pt x="2708317" y="7229"/>
+                  </a:lnTo>
+                  <a:cubicBezTo>
+                    <a:pt x="2734630" y="8572"/>
+                    <a:pt x="2760943" y="12155"/>
+                    <a:pt x="2787256" y="14619"/>
+                  </a:cubicBezTo>
+                  <a:cubicBezTo>
+                    <a:pt x="2997536" y="34885"/>
+                    <a:pt x="3207144" y="77994"/>
+                    <a:pt x="3408467" y="145064"/>
+                  </a:cubicBezTo>
+                  <a:lnTo>
+                    <a:pt x="3557723" y="199593"/>
+                  </a:lnTo>
+                  <a:cubicBezTo>
+                    <a:pt x="3570264" y="203848"/>
+                    <a:pt x="3582245" y="209447"/>
+                    <a:pt x="3594337" y="214597"/>
+                  </a:cubicBezTo>
+                  <a:lnTo>
+                    <a:pt x="3630616" y="230385"/>
+                  </a:lnTo>
+                  <a:lnTo>
+                    <a:pt x="3703172" y="262073"/>
+                  </a:lnTo>
+                  <a:cubicBezTo>
+                    <a:pt x="3715265" y="267335"/>
+                    <a:pt x="3727358" y="272598"/>
+                    <a:pt x="3739003" y="278756"/>
+                  </a:cubicBezTo>
+                  <a:cubicBezTo>
+                    <a:pt x="3744937" y="281667"/>
+                    <a:pt x="3750984" y="284131"/>
+                    <a:pt x="3756806" y="287266"/>
+                  </a:cubicBezTo>
+                  <a:cubicBezTo>
+                    <a:pt x="3762517" y="290513"/>
+                    <a:pt x="3768115" y="294208"/>
+                    <a:pt x="3773714" y="297567"/>
+                  </a:cubicBezTo>
+                  <a:lnTo>
+                    <a:pt x="3840784" y="339332"/>
+                  </a:lnTo>
+                  <a:cubicBezTo>
+                    <a:pt x="3851869" y="346386"/>
+                    <a:pt x="3863290" y="352881"/>
+                    <a:pt x="3873927" y="360495"/>
+                  </a:cubicBezTo>
+                  <a:lnTo>
+                    <a:pt x="3906062" y="383001"/>
+                  </a:lnTo>
+                  <a:lnTo>
+                    <a:pt x="3969662" y="428572"/>
+                  </a:lnTo>
+                  <a:cubicBezTo>
+                    <a:pt x="4137281" y="552188"/>
+                    <a:pt x="4285417" y="693270"/>
+                    <a:pt x="4423029" y="837600"/>
+                  </a:cubicBezTo>
+                  <a:cubicBezTo>
+                    <a:pt x="4440160" y="855739"/>
+                    <a:pt x="4457404" y="873766"/>
+                    <a:pt x="4474647" y="891569"/>
+                  </a:cubicBezTo>
+                  <a:lnTo>
+                    <a:pt x="4524250" y="946883"/>
+                  </a:lnTo>
+                  <a:lnTo>
+                    <a:pt x="4573965" y="1001748"/>
+                  </a:lnTo>
+                  <a:cubicBezTo>
+                    <a:pt x="4590760" y="1019887"/>
+                    <a:pt x="4605988" y="1039146"/>
+                    <a:pt x="4622224" y="1057509"/>
+                  </a:cubicBezTo>
+                  <a:cubicBezTo>
+                    <a:pt x="4653911" y="1094907"/>
+                    <a:pt x="4686831" y="1131409"/>
+                    <a:pt x="4717510" y="1169143"/>
+                  </a:cubicBezTo>
+                  <a:cubicBezTo>
+                    <a:pt x="4733186" y="1187730"/>
+                    <a:pt x="4748862" y="1206430"/>
+                    <a:pt x="4764986" y="1224681"/>
+                  </a:cubicBezTo>
+                  <a:cubicBezTo>
+                    <a:pt x="4780886" y="1243044"/>
+                    <a:pt x="4797233" y="1261071"/>
+                    <a:pt x="4813021" y="1279994"/>
+                  </a:cubicBezTo>
+                  <a:cubicBezTo>
+                    <a:pt x="4877292" y="1354230"/>
+                    <a:pt x="4941339" y="1428914"/>
+                    <a:pt x="5001915" y="1506846"/>
+                  </a:cubicBezTo>
+                  <a:cubicBezTo>
+                    <a:pt x="5062603" y="1584665"/>
+                    <a:pt x="5118252" y="1666739"/>
+                    <a:pt x="5170542" y="1751165"/>
+                  </a:cubicBezTo>
+                  <a:cubicBezTo>
+                    <a:pt x="5274898" y="1920240"/>
+                    <a:pt x="5363579" y="2101295"/>
+                    <a:pt x="5428969" y="2293660"/>
+                  </a:cubicBezTo>
+                  <a:cubicBezTo>
+                    <a:pt x="5494136" y="2485801"/>
+                    <a:pt x="5533102" y="2690819"/>
+                    <a:pt x="5534893" y="2899307"/>
+                  </a:cubicBezTo>
+                  <a:cubicBezTo>
+                    <a:pt x="5536124" y="3003439"/>
+                    <a:pt x="5526831" y="3108132"/>
+                    <a:pt x="5508804" y="3211144"/>
+                  </a:cubicBezTo>
+                  <a:cubicBezTo>
+                    <a:pt x="5490441" y="3314157"/>
+                    <a:pt x="5462336" y="3415490"/>
+                    <a:pt x="5426282" y="3513352"/>
+                  </a:cubicBezTo>
+                  <a:cubicBezTo>
+                    <a:pt x="5363355" y="3684890"/>
+                    <a:pt x="5302219" y="3856428"/>
+                    <a:pt x="5248250" y="4030542"/>
+                  </a:cubicBezTo>
+                  <a:lnTo>
+                    <a:pt x="5208612" y="4161771"/>
+                  </a:lnTo>
+                  <a:lnTo>
+                    <a:pt x="5170318" y="4294680"/>
+                  </a:lnTo>
+                  <a:lnTo>
+                    <a:pt x="5132248" y="4430164"/>
+                  </a:lnTo>
+                  <a:lnTo>
+                    <a:pt x="5112765" y="4498914"/>
+                  </a:lnTo>
+                  <a:lnTo>
+                    <a:pt x="5091715" y="4569119"/>
+                  </a:lnTo>
+                  <a:cubicBezTo>
+                    <a:pt x="5085221" y="4592297"/>
+                    <a:pt x="5076823" y="4616482"/>
+                    <a:pt x="5068985" y="4640220"/>
+                  </a:cubicBezTo>
+                  <a:cubicBezTo>
+                    <a:pt x="5060699" y="4664182"/>
+                    <a:pt x="5053981" y="4687807"/>
+                    <a:pt x="5043904" y="4712105"/>
+                  </a:cubicBezTo>
+                  <a:lnTo>
+                    <a:pt x="5015799" y="4784438"/>
+                  </a:lnTo>
+                  <a:cubicBezTo>
+                    <a:pt x="5005274" y="4808511"/>
+                    <a:pt x="4993965" y="4832473"/>
+                    <a:pt x="4982880" y="4856435"/>
+                  </a:cubicBezTo>
+                  <a:cubicBezTo>
+                    <a:pt x="4936524" y="4951273"/>
+                    <a:pt x="4881099" y="5044096"/>
+                    <a:pt x="4817276" y="5125275"/>
+                  </a:cubicBezTo>
+                  <a:cubicBezTo>
+                    <a:pt x="4755244" y="5208805"/>
+                    <a:pt x="4686943" y="5282817"/>
+                    <a:pt x="4618753" y="5355374"/>
+                  </a:cubicBezTo>
+                  <a:cubicBezTo>
+                    <a:pt x="4602069" y="5374073"/>
+                    <a:pt x="4584154" y="5391092"/>
+                    <a:pt x="4566575" y="5408560"/>
+                  </a:cubicBezTo>
+                  <a:lnTo>
+                    <a:pt x="4513837" y="5461186"/>
+                  </a:lnTo>
+                  <a:cubicBezTo>
+                    <a:pt x="4496593" y="5479101"/>
+                    <a:pt x="4477894" y="5495560"/>
+                    <a:pt x="4459531" y="5512580"/>
+                  </a:cubicBezTo>
+                  <a:lnTo>
+                    <a:pt x="4404554" y="5563526"/>
+                  </a:lnTo>
+                  <a:cubicBezTo>
+                    <a:pt x="4386527" y="5580770"/>
+                    <a:pt x="4366932" y="5596670"/>
+                    <a:pt x="4348009" y="5613017"/>
+                  </a:cubicBezTo>
+                  <a:lnTo>
+                    <a:pt x="4290568" y="5661948"/>
+                  </a:lnTo>
+                  <a:lnTo>
+                    <a:pt x="4276124" y="5674153"/>
+                  </a:lnTo>
+                  <a:lnTo>
+                    <a:pt x="4261120" y="5685798"/>
+                  </a:lnTo>
+                  <a:lnTo>
+                    <a:pt x="4231112" y="5708976"/>
+                  </a:lnTo>
+                  <a:lnTo>
+                    <a:pt x="4170984" y="5755443"/>
+                  </a:lnTo>
+                  <a:cubicBezTo>
+                    <a:pt x="4130227" y="5785563"/>
+                    <a:pt x="4087790" y="5813892"/>
+                    <a:pt x="4046025" y="5843228"/>
+                  </a:cubicBezTo>
+                  <a:cubicBezTo>
+                    <a:pt x="4002917" y="5870437"/>
+                    <a:pt x="3959248" y="5897309"/>
+                    <a:pt x="3915356" y="5923735"/>
+                  </a:cubicBezTo>
+                  <a:cubicBezTo>
+                    <a:pt x="3737659" y="6026299"/>
+                    <a:pt x="3544847" y="6106022"/>
+                    <a:pt x="3346323" y="6158872"/>
+                  </a:cubicBezTo>
+                  <a:cubicBezTo>
+                    <a:pt x="3147800" y="6211946"/>
+                    <a:pt x="2944462" y="6239714"/>
+                    <a:pt x="2743476" y="6247328"/>
+                  </a:cubicBezTo>
+                  <a:lnTo>
+                    <a:pt x="2668120" y="6249344"/>
+                  </a:lnTo>
+                  <a:lnTo>
+                    <a:pt x="2630498" y="6250127"/>
+                  </a:lnTo>
+                  <a:lnTo>
+                    <a:pt x="2592988" y="6249568"/>
+                  </a:lnTo>
+                  <a:lnTo>
+                    <a:pt x="2518080" y="6247777"/>
+                  </a:lnTo>
+                  <a:cubicBezTo>
+                    <a:pt x="2493110" y="6247105"/>
+                    <a:pt x="2468365" y="6246881"/>
+                    <a:pt x="2442948" y="6244529"/>
+                  </a:cubicBezTo>
+                  <a:cubicBezTo>
+                    <a:pt x="2392337" y="6240722"/>
+                    <a:pt x="2341950" y="6237699"/>
+                    <a:pt x="2291676" y="6232213"/>
+                  </a:cubicBezTo>
+                  <a:lnTo>
+                    <a:pt x="2141412" y="6212394"/>
+                  </a:lnTo>
+                  <a:lnTo>
+                    <a:pt x="1992715" y="6184961"/>
+                  </a:lnTo>
+                  <a:cubicBezTo>
+                    <a:pt x="1943561" y="6173988"/>
+                    <a:pt x="1894630" y="6162231"/>
+                    <a:pt x="1845811" y="6151034"/>
+                  </a:cubicBezTo>
+                  <a:cubicBezTo>
+                    <a:pt x="1797215" y="6138829"/>
+                    <a:pt x="1749180" y="6123938"/>
+                    <a:pt x="1701033" y="6110724"/>
+                  </a:cubicBezTo>
+                  <a:cubicBezTo>
+                    <a:pt x="1676847" y="6104566"/>
+                    <a:pt x="1653334" y="6095833"/>
+                    <a:pt x="1629484" y="6088219"/>
+                  </a:cubicBezTo>
+                  <a:lnTo>
+                    <a:pt x="1558383" y="6064929"/>
+                  </a:lnTo>
+                  <a:cubicBezTo>
+                    <a:pt x="1369713" y="6000210"/>
+                    <a:pt x="1186978" y="5921271"/>
+                    <a:pt x="1011968" y="5828896"/>
+                  </a:cubicBezTo>
+                  <a:cubicBezTo>
+                    <a:pt x="837071" y="5736408"/>
+                    <a:pt x="668556" y="5631940"/>
+                    <a:pt x="511237" y="5512356"/>
+                  </a:cubicBezTo>
+                  <a:cubicBezTo>
+                    <a:pt x="471152" y="5483468"/>
+                    <a:pt x="433642" y="5451220"/>
+                    <a:pt x="395572" y="5419757"/>
+                  </a:cubicBezTo>
+                  <a:cubicBezTo>
+                    <a:pt x="356831" y="5388965"/>
+                    <a:pt x="321112" y="5354926"/>
+                    <a:pt x="284722" y="5321559"/>
+                  </a:cubicBezTo>
+                  <a:lnTo>
+                    <a:pt x="257513" y="5296477"/>
+                  </a:lnTo>
+                  <a:lnTo>
+                    <a:pt x="243853" y="5283937"/>
+                  </a:lnTo>
+                  <a:lnTo>
+                    <a:pt x="230752" y="5270836"/>
+                  </a:lnTo>
+                  <a:lnTo>
+                    <a:pt x="178574" y="5218322"/>
+                  </a:lnTo>
+                  <a:cubicBezTo>
+                    <a:pt x="161331" y="5200631"/>
+                    <a:pt x="143191" y="5183948"/>
+                    <a:pt x="126508" y="5165584"/>
+                  </a:cubicBezTo>
+                  <a:lnTo>
+                    <a:pt x="76345" y="5111167"/>
+                  </a:lnTo>
+                  <a:cubicBezTo>
+                    <a:pt x="59774" y="5092916"/>
+                    <a:pt x="42530" y="5075112"/>
+                    <a:pt x="26407" y="5056413"/>
+                  </a:cubicBezTo>
+                  <a:lnTo>
+                    <a:pt x="0" y="5024776"/>
+                  </a:lnTo>
+                  <a:lnTo>
+                    <a:pt x="0" y="4492798"/>
+                  </a:lnTo>
+                  <a:lnTo>
+                    <a:pt x="28534" y="4537879"/>
+                  </a:lnTo>
+                  <a:cubicBezTo>
+                    <a:pt x="41299" y="4556130"/>
+                    <a:pt x="54175" y="4574382"/>
+                    <a:pt x="66604" y="4592745"/>
+                  </a:cubicBezTo>
+                  <a:lnTo>
+                    <a:pt x="104114" y="4647834"/>
+                  </a:lnTo>
+                  <a:lnTo>
+                    <a:pt x="143751" y="4701580"/>
+                  </a:lnTo>
+                  <a:cubicBezTo>
+                    <a:pt x="156964" y="4719495"/>
+                    <a:pt x="169728" y="4737746"/>
+                    <a:pt x="182717" y="4755773"/>
+                  </a:cubicBezTo>
+                  <a:lnTo>
+                    <a:pt x="223810" y="4808399"/>
+                  </a:lnTo>
+                  <a:lnTo>
+                    <a:pt x="264679" y="4861249"/>
+                  </a:lnTo>
+                  <a:cubicBezTo>
+                    <a:pt x="278563" y="4878717"/>
+                    <a:pt x="293455" y="4895288"/>
+                    <a:pt x="307788" y="4912420"/>
+                  </a:cubicBezTo>
+                  <a:lnTo>
+                    <a:pt x="351232" y="4963254"/>
+                  </a:lnTo>
+                  <a:cubicBezTo>
+                    <a:pt x="365788" y="4980162"/>
+                    <a:pt x="381688" y="4995837"/>
+                    <a:pt x="397028" y="5012185"/>
+                  </a:cubicBezTo>
+                  <a:lnTo>
+                    <a:pt x="443496" y="5060444"/>
+                  </a:lnTo>
+                  <a:lnTo>
+                    <a:pt x="455140" y="5072537"/>
+                  </a:lnTo>
+                  <a:lnTo>
+                    <a:pt x="467345" y="5083958"/>
+                  </a:lnTo>
+                  <a:lnTo>
+                    <a:pt x="491755" y="5106912"/>
+                  </a:lnTo>
+                  <a:lnTo>
+                    <a:pt x="540686" y="5152819"/>
+                  </a:lnTo>
+                  <a:lnTo>
+                    <a:pt x="552890" y="5164353"/>
+                  </a:lnTo>
+                  <a:lnTo>
+                    <a:pt x="565655" y="5175214"/>
+                  </a:lnTo>
+                  <a:lnTo>
+                    <a:pt x="591072" y="5197048"/>
+                  </a:lnTo>
+                  <a:cubicBezTo>
+                    <a:pt x="624999" y="5226160"/>
+                    <a:pt x="658366" y="5256056"/>
+                    <a:pt x="694197" y="5283041"/>
+                  </a:cubicBezTo>
+                  <a:cubicBezTo>
+                    <a:pt x="834272" y="5394675"/>
+                    <a:pt x="985207" y="5493881"/>
+                    <a:pt x="1146221" y="5573716"/>
+                  </a:cubicBezTo>
+                  <a:cubicBezTo>
+                    <a:pt x="1307122" y="5653774"/>
+                    <a:pt x="1476869" y="5715918"/>
+                    <a:pt x="1650982" y="5758130"/>
+                  </a:cubicBezTo>
+                  <a:lnTo>
+                    <a:pt x="1716485" y="5772798"/>
+                  </a:lnTo>
+                  <a:cubicBezTo>
+                    <a:pt x="1738431" y="5777390"/>
+                    <a:pt x="1759929" y="5783100"/>
+                    <a:pt x="1782211" y="5786235"/>
+                  </a:cubicBezTo>
+                  <a:lnTo>
+                    <a:pt x="1848386" y="5796984"/>
+                  </a:lnTo>
+                  <a:lnTo>
+                    <a:pt x="1881417" y="5802359"/>
+                  </a:lnTo>
+                  <a:cubicBezTo>
+                    <a:pt x="1892390" y="5804151"/>
+                    <a:pt x="1903363" y="5806054"/>
+                    <a:pt x="1914560" y="5807061"/>
+                  </a:cubicBezTo>
+                  <a:cubicBezTo>
+                    <a:pt x="1959012" y="5811765"/>
+                    <a:pt x="2003241" y="5817251"/>
+                    <a:pt x="2047469" y="5821282"/>
+                  </a:cubicBezTo>
+                  <a:lnTo>
+                    <a:pt x="2180601" y="5828896"/>
+                  </a:lnTo>
+                  <a:lnTo>
+                    <a:pt x="2313622" y="5830463"/>
+                  </a:lnTo>
+                  <a:cubicBezTo>
+                    <a:pt x="2335680" y="5830799"/>
+                    <a:pt x="2357962" y="5829008"/>
+                    <a:pt x="2380021" y="5828448"/>
+                  </a:cubicBezTo>
+                  <a:lnTo>
+                    <a:pt x="2446195" y="5826433"/>
+                  </a:lnTo>
+                  <a:cubicBezTo>
+                    <a:pt x="2468029" y="5826208"/>
+                    <a:pt x="2490647" y="5824193"/>
+                    <a:pt x="2513041" y="5822737"/>
+                  </a:cubicBezTo>
+                  <a:lnTo>
+                    <a:pt x="2580111" y="5818258"/>
+                  </a:lnTo>
+                  <a:lnTo>
+                    <a:pt x="2613590" y="5816355"/>
+                  </a:lnTo>
+                  <a:lnTo>
+                    <a:pt x="2646845" y="5813108"/>
+                  </a:lnTo>
+                  <a:cubicBezTo>
+                    <a:pt x="2669016" y="5810869"/>
+                    <a:pt x="2691074" y="5808741"/>
+                    <a:pt x="2713244" y="5806838"/>
+                  </a:cubicBezTo>
+                  <a:cubicBezTo>
+                    <a:pt x="2889933" y="5789371"/>
+                    <a:pt x="3062815" y="5762050"/>
+                    <a:pt x="3230882" y="5721292"/>
+                  </a:cubicBezTo>
+                  <a:cubicBezTo>
+                    <a:pt x="3398837" y="5680423"/>
+                    <a:pt x="3562426" y="5626902"/>
+                    <a:pt x="3720416" y="5556472"/>
+                  </a:cubicBezTo>
+                  <a:cubicBezTo>
+                    <a:pt x="3759381" y="5537997"/>
+                    <a:pt x="3798347" y="5518962"/>
+                    <a:pt x="3837425" y="5499927"/>
+                  </a:cubicBezTo>
+                  <a:cubicBezTo>
+                    <a:pt x="3875271" y="5478765"/>
+                    <a:pt x="3913900" y="5458610"/>
+                    <a:pt x="3951634" y="5436552"/>
+                  </a:cubicBezTo>
+                  <a:lnTo>
+                    <a:pt x="4007284" y="5401841"/>
+                  </a:lnTo>
+                  <a:lnTo>
+                    <a:pt x="4035164" y="5384374"/>
+                  </a:lnTo>
+                  <a:lnTo>
+                    <a:pt x="4049049" y="5375640"/>
+                  </a:lnTo>
+                  <a:lnTo>
+                    <a:pt x="4062485" y="5366123"/>
+                  </a:lnTo>
+                  <a:lnTo>
+                    <a:pt x="4116567" y="5328277"/>
+                  </a:lnTo>
+                  <a:cubicBezTo>
+                    <a:pt x="4134594" y="5315624"/>
+                    <a:pt x="4152957" y="5303420"/>
+                    <a:pt x="4169976" y="5289199"/>
+                  </a:cubicBezTo>
+                  <a:lnTo>
+                    <a:pt x="4222042" y="5247994"/>
+                  </a:lnTo>
+                  <a:cubicBezTo>
+                    <a:pt x="4239398" y="5234222"/>
+                    <a:pt x="4256865" y="5220562"/>
+                    <a:pt x="4273213" y="5205558"/>
+                  </a:cubicBezTo>
+                  <a:lnTo>
+                    <a:pt x="4323151" y="5161329"/>
+                  </a:lnTo>
+                  <a:cubicBezTo>
+                    <a:pt x="4339611" y="5146437"/>
+                    <a:pt x="4356631" y="5131881"/>
+                    <a:pt x="4371971" y="5116093"/>
+                  </a:cubicBezTo>
+                  <a:cubicBezTo>
+                    <a:pt x="4435457" y="5054398"/>
+                    <a:pt x="4496258" y="4991135"/>
+                    <a:pt x="4546868" y="4924400"/>
+                  </a:cubicBezTo>
+                  <a:cubicBezTo>
+                    <a:pt x="4600054" y="4858450"/>
+                    <a:pt x="4640699" y="4788916"/>
+                    <a:pt x="4675634" y="4715352"/>
+                  </a:cubicBezTo>
+                  <a:lnTo>
+                    <a:pt x="4700155" y="4659255"/>
+                  </a:lnTo>
+                  <a:lnTo>
+                    <a:pt x="4721206" y="4600135"/>
+                  </a:lnTo>
+                  <a:cubicBezTo>
+                    <a:pt x="4728707" y="4580988"/>
+                    <a:pt x="4733970" y="4559266"/>
+                    <a:pt x="4740465" y="4538887"/>
+                  </a:cubicBezTo>
+                  <a:cubicBezTo>
+                    <a:pt x="4746623" y="4518061"/>
+                    <a:pt x="4753005" y="4497906"/>
+                    <a:pt x="4758492" y="4475848"/>
+                  </a:cubicBezTo>
+                  <a:cubicBezTo>
+                    <a:pt x="4803168" y="4303637"/>
+                    <a:pt x="4840902" y="4115080"/>
+                    <a:pt x="4891288" y="3930329"/>
+                  </a:cubicBezTo>
+                  <a:cubicBezTo>
+                    <a:pt x="4940891" y="3744906"/>
+                    <a:pt x="5000235" y="3562059"/>
+                    <a:pt x="5066298" y="3382235"/>
+                  </a:cubicBezTo>
+                  <a:cubicBezTo>
+                    <a:pt x="5124186" y="3226932"/>
+                    <a:pt x="5154530" y="3064015"/>
+                    <a:pt x="5156994" y="2898635"/>
+                  </a:cubicBezTo>
+                  <a:cubicBezTo>
+                    <a:pt x="5159681" y="2733255"/>
+                    <a:pt x="5132920" y="2565636"/>
+                    <a:pt x="5083317" y="2402047"/>
+                  </a:cubicBezTo>
+                  <a:cubicBezTo>
+                    <a:pt x="5033938" y="2238123"/>
+                    <a:pt x="4960150" y="2079013"/>
+                    <a:pt x="4871022" y="1926958"/>
+                  </a:cubicBezTo>
+                  <a:cubicBezTo>
+                    <a:pt x="4826570" y="1850818"/>
+                    <a:pt x="4777415" y="1776918"/>
+                    <a:pt x="4727028" y="1703577"/>
+                  </a:cubicBezTo>
+                  <a:cubicBezTo>
+                    <a:pt x="4676418" y="1630349"/>
+                    <a:pt x="4622784" y="1558464"/>
+                    <a:pt x="4563776" y="1490834"/>
+                  </a:cubicBezTo>
+                  <a:cubicBezTo>
+                    <a:pt x="4503647" y="1423764"/>
+                    <a:pt x="4439041" y="1359157"/>
+                    <a:pt x="4370291" y="1300596"/>
+                  </a:cubicBezTo>
+                  <a:cubicBezTo>
+                    <a:pt x="4336812" y="1270141"/>
+                    <a:pt x="4301541" y="1242148"/>
+                    <a:pt x="4266046" y="1214491"/>
+                  </a:cubicBezTo>
+                  <a:cubicBezTo>
+                    <a:pt x="4248355" y="1200607"/>
+                    <a:pt x="4230776" y="1186611"/>
+                    <a:pt x="4212973" y="1173062"/>
+                  </a:cubicBezTo>
+                  <a:cubicBezTo>
+                    <a:pt x="4194722" y="1160074"/>
+                    <a:pt x="4176359" y="1147197"/>
+                    <a:pt x="4157995" y="1134545"/>
+                  </a:cubicBezTo>
+                  <a:cubicBezTo>
+                    <a:pt x="4011426" y="1031980"/>
+                    <a:pt x="3855004" y="948562"/>
+                    <a:pt x="3697126" y="881044"/>
+                  </a:cubicBezTo>
+                  <a:lnTo>
+                    <a:pt x="3637670" y="856747"/>
+                  </a:lnTo>
+                  <a:lnTo>
+                    <a:pt x="3608222" y="844318"/>
+                  </a:lnTo>
+                  <a:cubicBezTo>
+                    <a:pt x="3598480" y="840063"/>
+                    <a:pt x="3588179" y="837040"/>
+                    <a:pt x="3578214" y="833457"/>
+                  </a:cubicBezTo>
+                  <a:lnTo>
+                    <a:pt x="3518309" y="812294"/>
+                  </a:lnTo>
+                  <a:cubicBezTo>
+                    <a:pt x="3513383" y="810503"/>
+                    <a:pt x="3508344" y="808823"/>
+                    <a:pt x="3503417" y="806920"/>
+                  </a:cubicBezTo>
+                  <a:cubicBezTo>
+                    <a:pt x="3498603" y="804792"/>
+                    <a:pt x="3494236" y="801993"/>
+                    <a:pt x="3489533" y="799642"/>
+                  </a:cubicBezTo>
+                  <a:cubicBezTo>
+                    <a:pt x="3480240" y="794827"/>
+                    <a:pt x="3470498" y="791020"/>
+                    <a:pt x="3460869" y="787101"/>
+                  </a:cubicBezTo>
+                  <a:lnTo>
+                    <a:pt x="3402980" y="763475"/>
+                  </a:lnTo>
+                  <a:lnTo>
+                    <a:pt x="3374092" y="751606"/>
+                  </a:lnTo>
+                  <a:cubicBezTo>
+                    <a:pt x="3364462" y="747688"/>
+                    <a:pt x="3354945" y="743433"/>
+                    <a:pt x="3344980" y="740409"/>
+                  </a:cubicBezTo>
+                  <a:lnTo>
+                    <a:pt x="3226627" y="700772"/>
+                  </a:lnTo>
+                  <a:cubicBezTo>
+                    <a:pt x="3067405" y="652849"/>
+                    <a:pt x="2902697" y="625192"/>
+                    <a:pt x="2735750" y="614667"/>
+                  </a:cubicBezTo>
+                  <a:cubicBezTo>
+                    <a:pt x="2714811" y="613435"/>
+                    <a:pt x="2694209" y="610860"/>
+                    <a:pt x="2673158" y="610412"/>
+                  </a:cubicBezTo>
+                  <a:lnTo>
+                    <a:pt x="2610119" y="609628"/>
+                  </a:lnTo>
+                  <a:lnTo>
+                    <a:pt x="2547080" y="608620"/>
+                  </a:lnTo>
+                  <a:cubicBezTo>
+                    <a:pt x="2536443" y="608173"/>
+                    <a:pt x="2526365" y="608397"/>
+                    <a:pt x="2516400" y="608844"/>
+                  </a:cubicBezTo>
+                  <a:lnTo>
+                    <a:pt x="2486280" y="609740"/>
+                  </a:lnTo>
+                  <a:cubicBezTo>
+                    <a:pt x="2466125" y="609852"/>
+                    <a:pt x="2446307" y="611868"/>
+                    <a:pt x="2426376" y="613099"/>
+                  </a:cubicBezTo>
+                  <a:cubicBezTo>
+                    <a:pt x="2406333" y="613995"/>
+                    <a:pt x="2386627" y="616458"/>
+                    <a:pt x="2366920" y="618474"/>
+                  </a:cubicBezTo>
+                  <a:cubicBezTo>
+                    <a:pt x="2357066" y="619482"/>
+                    <a:pt x="2347101" y="620153"/>
+                    <a:pt x="2337248" y="621497"/>
+                  </a:cubicBezTo>
+                  <a:lnTo>
+                    <a:pt x="2307800" y="625528"/>
+                  </a:lnTo>
+                  <a:lnTo>
+                    <a:pt x="2278351" y="629559"/>
+                  </a:lnTo>
+                  <a:lnTo>
+                    <a:pt x="2249127" y="634710"/>
+                  </a:lnTo>
+                  <a:cubicBezTo>
+                    <a:pt x="2093377" y="661918"/>
+                    <a:pt x="1942329" y="710849"/>
+                    <a:pt x="1796096" y="781726"/>
+                  </a:cubicBezTo>
+                  <a:cubicBezTo>
+                    <a:pt x="1649751" y="852268"/>
+                    <a:pt x="1508892" y="944307"/>
+                    <a:pt x="1370833" y="1048663"/>
+                  </a:cubicBezTo>
+                  <a:cubicBezTo>
+                    <a:pt x="1232774" y="1153244"/>
+                    <a:pt x="1097290" y="1269917"/>
+                    <a:pt x="959790" y="1390844"/>
+                  </a:cubicBezTo>
+                  <a:lnTo>
+                    <a:pt x="749062" y="1577611"/>
+                  </a:lnTo>
+                  <a:cubicBezTo>
+                    <a:pt x="674602" y="1642329"/>
+                    <a:pt x="599806" y="1704137"/>
+                    <a:pt x="524786" y="1763145"/>
+                  </a:cubicBezTo>
+                  <a:cubicBezTo>
+                    <a:pt x="374858" y="1881498"/>
+                    <a:pt x="223810" y="1987422"/>
+                    <a:pt x="84071" y="2098496"/>
+                  </a:cubicBezTo>
+                  <a:lnTo>
+                    <a:pt x="0" y="2168094"/>
+                  </a:lnTo>
+                  <a:lnTo>
+                    <a:pt x="0" y="1576676"/>
+                  </a:lnTo>
+                  <a:lnTo>
+                    <a:pt x="174655" y="1387597"/>
+                  </a:lnTo>
+                  <a:cubicBezTo>
+                    <a:pt x="238926" y="1320079"/>
+                    <a:pt x="302749" y="1254577"/>
+                    <a:pt x="363661" y="1188626"/>
+                  </a:cubicBezTo>
+                  <a:lnTo>
+                    <a:pt x="458052" y="1086397"/>
+                  </a:lnTo>
+                  <a:cubicBezTo>
+                    <a:pt x="490635" y="1051351"/>
+                    <a:pt x="523666" y="1016416"/>
+                    <a:pt x="557257" y="981593"/>
+                  </a:cubicBezTo>
+                  <a:cubicBezTo>
+                    <a:pt x="691510" y="842414"/>
+                    <a:pt x="835055" y="705699"/>
+                    <a:pt x="994165" y="578389"/>
+                  </a:cubicBezTo>
+                  <a:cubicBezTo>
+                    <a:pt x="1152939" y="451190"/>
+                    <a:pt x="1328060" y="333398"/>
+                    <a:pt x="1520873" y="237215"/>
+                  </a:cubicBezTo>
+                  <a:cubicBezTo>
+                    <a:pt x="1713238" y="141033"/>
+                    <a:pt x="1924302" y="68028"/>
+                    <a:pt x="2141748" y="31190"/>
+                  </a:cubicBezTo>
+                  <a:lnTo>
+                    <a:pt x="2182505" y="24360"/>
+                  </a:lnTo>
+                  <a:cubicBezTo>
+                    <a:pt x="2196165" y="22344"/>
+                    <a:pt x="2209826" y="20665"/>
+                    <a:pt x="2223374" y="18873"/>
+                  </a:cubicBezTo>
+                  <a:lnTo>
+                    <a:pt x="2264355" y="13611"/>
+                  </a:lnTo>
+                  <a:cubicBezTo>
+                    <a:pt x="2278015" y="11931"/>
+                    <a:pt x="2291676" y="10924"/>
+                    <a:pt x="2305336" y="9580"/>
+                  </a:cubicBezTo>
+                  <a:cubicBezTo>
+                    <a:pt x="2332657" y="7229"/>
+                    <a:pt x="2360090" y="4653"/>
+                    <a:pt x="2387410" y="3645"/>
+                  </a:cubicBezTo>
+                  <a:cubicBezTo>
+                    <a:pt x="2414731" y="2414"/>
+                    <a:pt x="2442164" y="510"/>
+                    <a:pt x="2469373" y="622"/>
+                  </a:cubicBezTo>
+                  <a:close/>
+                </a:path>
+              </a:pathLst>
+            </a:custGeom>
+            <a:gradFill>
+              <a:gsLst>
+                <a:gs pos="2000">
+                  <a:schemeClr val="bg1">
+                    <a:alpha val="10000"/>
+                  </a:schemeClr>
+                </a:gs>
+                <a:gs pos="16000">
+                  <a:schemeClr val="accent6">
+                    <a:alpha val="10000"/>
+                  </a:schemeClr>
+                </a:gs>
+                <a:gs pos="100000">
+                  <a:schemeClr val="bg1">
+                    <a:alpha val="10000"/>
+                  </a:schemeClr>
+                </a:gs>
+                <a:gs pos="85000">
+                  <a:schemeClr val="accent1">
+                    <a:alpha val="10000"/>
+                  </a:schemeClr>
+                </a:gs>
+              </a:gsLst>
+              <a:lin ang="12000000" scaled="0"/>
+            </a:gradFill>
+            <a:ln>
+              <a:noFill/>
+            </a:ln>
+          </p:spPr>
+          <p:style>
+            <a:lnRef idx="2">
+              <a:schemeClr val="accent1">
+                <a:shade val="50000"/>
+              </a:schemeClr>
+            </a:lnRef>
+            <a:fillRef idx="1">
+              <a:schemeClr val="accent1"/>
+            </a:fillRef>
+            <a:effectRef idx="0">
+              <a:schemeClr val="accent1"/>
+            </a:effectRef>
+            <a:fontRef idx="minor">
+              <a:schemeClr val="lt1"/>
+            </a:fontRef>
+          </p:style>
+          <p:txBody>
+            <a:bodyPr wrap="square" rtlCol="0" anchor="ctr">
+              <a:noAutofit/>
+            </a:bodyPr>
+            <a:lstStyle/>
+            <a:p>
+              <a:pPr algn="ctr"/>
+              <a:endParaRPr lang="en-US"/>
+            </a:p>
+          </p:txBody>
+        </p:sp>
+        <p:sp>
+          <p:nvSpPr>
+            <p:cNvPr id="35" name="Freeform: Shape 20">
+              <a:extLst>
+                <a:ext uri="{FF2B5EF4-FFF2-40B4-BE49-F238E27FC236}">
+                  <a16:creationId xmlns:a16="http://schemas.microsoft.com/office/drawing/2014/main" id="{F1E75360-B005-450D-92A5-52D30214982E}"/>
+                </a:ext>
+                <a:ext uri="{C183D7F6-B498-43B3-948B-1728B52AA6E4}">
+                  <adec:decorative xmlns:adec="http://schemas.microsoft.com/office/drawing/2017/decorative" val="1"/>
+                </a:ext>
+              </a:extLst>
+            </p:cNvPr>
+            <p:cNvSpPr/>
+            <p:nvPr>
+              <p:extLst>
+                <p:ext uri="{386F3935-93C4-4BCD-93E2-E3B085C9AB24}">
+                  <p16:designElem xmlns:p16="http://schemas.microsoft.com/office/powerpoint/2015/main" val="1"/>
+                </p:ext>
+              </p:extLst>
+            </p:nvPr>
+          </p:nvSpPr>
+          <p:spPr>
+            <a:xfrm>
+              <a:off x="-19221" y="176241"/>
+              <a:ext cx="5646908" cy="6130481"/>
+            </a:xfrm>
+            <a:custGeom>
+              <a:avLst/>
+              <a:gdLst>
+                <a:gd name="connsiteX0" fmla="*/ 2616837 w 5646908"/>
+                <a:gd name="connsiteY0" fmla="*/ 0 h 6130481"/>
+                <a:gd name="connsiteX1" fmla="*/ 4918721 w 5646908"/>
+                <a:gd name="connsiteY1" fmla="*/ 1134258 h 6130481"/>
+                <a:gd name="connsiteX2" fmla="*/ 5539036 w 5646908"/>
+                <a:gd name="connsiteY2" fmla="*/ 3362353 h 6130481"/>
+                <a:gd name="connsiteX3" fmla="*/ 4712024 w 5646908"/>
+                <a:gd name="connsiteY3" fmla="*/ 5293280 h 6130481"/>
+                <a:gd name="connsiteX4" fmla="*/ 2547864 w 5646908"/>
+                <a:gd name="connsiteY4" fmla="*/ 6130481 h 6130481"/>
+                <a:gd name="connsiteX5" fmla="*/ 263223 w 5646908"/>
+                <a:gd name="connsiteY5" fmla="*/ 5212325 h 6130481"/>
+                <a:gd name="connsiteX6" fmla="*/ 49974 w 5646908"/>
+                <a:gd name="connsiteY6" fmla="*/ 4985345 h 6130481"/>
+                <a:gd name="connsiteX7" fmla="*/ 0 w 5646908"/>
+                <a:gd name="connsiteY7" fmla="*/ 4920618 h 6130481"/>
+                <a:gd name="connsiteX8" fmla="*/ 0 w 5646908"/>
+                <a:gd name="connsiteY8" fmla="*/ 3760303 h 6130481"/>
+                <a:gd name="connsiteX9" fmla="*/ 80488 w 5646908"/>
+                <a:gd name="connsiteY9" fmla="*/ 3974159 h 6130481"/>
+                <a:gd name="connsiteX10" fmla="*/ 664748 w 5646908"/>
+                <a:gd name="connsiteY10" fmla="*/ 4813600 h 6130481"/>
+                <a:gd name="connsiteX11" fmla="*/ 2548087 w 5646908"/>
+                <a:gd name="connsiteY11" fmla="*/ 5570406 h 6130481"/>
+                <a:gd name="connsiteX12" fmla="*/ 3536561 w 5646908"/>
+                <a:gd name="connsiteY12" fmla="*/ 5407153 h 6130481"/>
+                <a:gd name="connsiteX13" fmla="*/ 4308035 w 5646908"/>
+                <a:gd name="connsiteY13" fmla="*/ 4897241 h 6130481"/>
+                <a:gd name="connsiteX14" fmla="*/ 4569038 w 5646908"/>
+                <a:gd name="connsiteY14" fmla="*/ 4564802 h 6130481"/>
+                <a:gd name="connsiteX15" fmla="*/ 4699147 w 5646908"/>
+                <a:gd name="connsiteY15" fmla="*/ 4149952 h 6130481"/>
+                <a:gd name="connsiteX16" fmla="*/ 5003034 w 5646908"/>
+                <a:gd name="connsiteY16" fmla="*/ 3168421 h 6130481"/>
+                <a:gd name="connsiteX17" fmla="*/ 4994189 w 5646908"/>
+                <a:gd name="connsiteY17" fmla="*/ 2321590 h 6130481"/>
+                <a:gd name="connsiteX18" fmla="*/ 4487860 w 5646908"/>
+                <a:gd name="connsiteY18" fmla="*/ 1501856 h 6130481"/>
+                <a:gd name="connsiteX19" fmla="*/ 3640469 w 5646908"/>
+                <a:gd name="connsiteY19" fmla="*/ 808425 h 6130481"/>
+                <a:gd name="connsiteX20" fmla="*/ 2616837 w 5646908"/>
+                <a:gd name="connsiteY20" fmla="*/ 559851 h 6130481"/>
+                <a:gd name="connsiteX21" fmla="*/ 1762952 w 5646908"/>
+                <a:gd name="connsiteY21" fmla="*/ 812008 h 6130481"/>
+                <a:gd name="connsiteX22" fmla="*/ 939635 w 5646908"/>
+                <a:gd name="connsiteY22" fmla="*/ 1502976 h 6130481"/>
+                <a:gd name="connsiteX23" fmla="*/ 585250 w 5646908"/>
+                <a:gd name="connsiteY23" fmla="*/ 1831049 h 6130481"/>
+                <a:gd name="connsiteX24" fmla="*/ 40403 w 5646908"/>
+                <a:gd name="connsiteY24" fmla="*/ 2389556 h 6130481"/>
+                <a:gd name="connsiteX25" fmla="*/ 0 w 5646908"/>
+                <a:gd name="connsiteY25" fmla="*/ 2456747 h 6130481"/>
+                <a:gd name="connsiteX26" fmla="*/ 0 w 5646908"/>
+                <a:gd name="connsiteY26" fmla="*/ 1601114 h 6130481"/>
+                <a:gd name="connsiteX27" fmla="*/ 93200 w 5646908"/>
+                <a:gd name="connsiteY27" fmla="*/ 1513741 h 6130481"/>
+                <a:gd name="connsiteX28" fmla="*/ 535423 w 5646908"/>
+                <a:gd name="connsiteY28" fmla="*/ 1107273 h 6130481"/>
+                <a:gd name="connsiteX29" fmla="*/ 2616837 w 5646908"/>
+                <a:gd name="connsiteY29" fmla="*/ 0 h 6130481"/>
+              </a:gdLst>
+              <a:ahLst/>
+              <a:cxnLst>
+                <a:cxn ang="0">
+                  <a:pos x="connsiteX0" y="connsiteY0"/>
+                </a:cxn>
+                <a:cxn ang="0">
+                  <a:pos x="connsiteX1" y="connsiteY1"/>
+                </a:cxn>
+                <a:cxn ang="0">
+                  <a:pos x="connsiteX2" y="connsiteY2"/>
+                </a:cxn>
+                <a:cxn ang="0">
+                  <a:pos x="connsiteX3" y="connsiteY3"/>
+                </a:cxn>
+                <a:cxn ang="0">
+                  <a:pos x="connsiteX4" y="connsiteY4"/>
+                </a:cxn>
+                <a:cxn ang="0">
+                  <a:pos x="connsiteX5" y="connsiteY5"/>
+                </a:cxn>
+                <a:cxn ang="0">
+                  <a:pos x="connsiteX6" y="connsiteY6"/>
+                </a:cxn>
+                <a:cxn ang="0">
+                  <a:pos x="connsiteX7" y="connsiteY7"/>
+                </a:cxn>
+                <a:cxn ang="0">
+                  <a:pos x="connsiteX8" y="connsiteY8"/>
+                </a:cxn>
+                <a:cxn ang="0">
+                  <a:pos x="connsiteX9" y="connsiteY9"/>
+                </a:cxn>
+                <a:cxn ang="0">
+                  <a:pos x="connsiteX10" y="connsiteY10"/>
+                </a:cxn>
+                <a:cxn ang="0">
+                  <a:pos x="connsiteX11" y="connsiteY11"/>
+                </a:cxn>
+                <a:cxn ang="0">
+                  <a:pos x="connsiteX12" y="connsiteY12"/>
+                </a:cxn>
+                <a:cxn ang="0">
+                  <a:pos x="connsiteX13" y="connsiteY13"/>
+                </a:cxn>
+                <a:cxn ang="0">
+                  <a:pos x="connsiteX14" y="connsiteY14"/>
+                </a:cxn>
+                <a:cxn ang="0">
+                  <a:pos x="connsiteX15" y="connsiteY15"/>
+                </a:cxn>
+                <a:cxn ang="0">
+                  <a:pos x="connsiteX16" y="connsiteY16"/>
+                </a:cxn>
+                <a:cxn ang="0">
+                  <a:pos x="connsiteX17" y="connsiteY17"/>
+                </a:cxn>
+                <a:cxn ang="0">
+                  <a:pos x="connsiteX18" y="connsiteY18"/>
+                </a:cxn>
+                <a:cxn ang="0">
+                  <a:pos x="connsiteX19" y="connsiteY19"/>
+                </a:cxn>
+                <a:cxn ang="0">
+                  <a:pos x="connsiteX20" y="connsiteY20"/>
+                </a:cxn>
+                <a:cxn ang="0">
+                  <a:pos x="connsiteX21" y="connsiteY21"/>
+                </a:cxn>
+                <a:cxn ang="0">
+                  <a:pos x="connsiteX22" y="connsiteY22"/>
+                </a:cxn>
+                <a:cxn ang="0">
+                  <a:pos x="connsiteX23" y="connsiteY23"/>
+                </a:cxn>
+                <a:cxn ang="0">
+                  <a:pos x="connsiteX24" y="connsiteY24"/>
+                </a:cxn>
+                <a:cxn ang="0">
+                  <a:pos x="connsiteX25" y="connsiteY25"/>
+                </a:cxn>
+                <a:cxn ang="0">
+                  <a:pos x="connsiteX26" y="connsiteY26"/>
+                </a:cxn>
+                <a:cxn ang="0">
+                  <a:pos x="connsiteX27" y="connsiteY27"/>
+                </a:cxn>
+                <a:cxn ang="0">
+                  <a:pos x="connsiteX28" y="connsiteY28"/>
+                </a:cxn>
+                <a:cxn ang="0">
+                  <a:pos x="connsiteX29" y="connsiteY29"/>
+                </a:cxn>
+              </a:cxnLst>
+              <a:rect l="l" t="t" r="r" b="b"/>
+              <a:pathLst>
+                <a:path w="5646908" h="6130481">
+                  <a:moveTo>
+                    <a:pt x="2616837" y="0"/>
+                  </a:moveTo>
+                  <a:cubicBezTo>
+                    <a:pt x="3596241" y="0"/>
+                    <a:pt x="4322479" y="463445"/>
+                    <a:pt x="4918721" y="1134258"/>
+                  </a:cubicBezTo>
+                  <a:cubicBezTo>
+                    <a:pt x="5416317" y="1694109"/>
+                    <a:pt x="5857703" y="2516643"/>
+                    <a:pt x="5539036" y="3362353"/>
+                  </a:cubicBezTo>
+                  <a:cubicBezTo>
+                    <a:pt x="5111758" y="4496612"/>
+                    <a:pt x="5300763" y="4716633"/>
+                    <a:pt x="4712024" y="5293280"/>
+                  </a:cubicBezTo>
+                  <a:cubicBezTo>
+                    <a:pt x="4123284" y="5869926"/>
+                    <a:pt x="3446201" y="6130481"/>
+                    <a:pt x="2547864" y="6130481"/>
+                  </a:cubicBezTo>
+                  <a:cubicBezTo>
+                    <a:pt x="1657476" y="6130481"/>
+                    <a:pt x="850619" y="5780127"/>
+                    <a:pt x="263223" y="5212325"/>
+                  </a:cubicBezTo>
+                  <a:cubicBezTo>
+                    <a:pt x="188497" y="5140091"/>
+                    <a:pt x="117321" y="5064339"/>
+                    <a:pt x="49974" y="4985345"/>
+                  </a:cubicBezTo>
+                  <a:lnTo>
+                    <a:pt x="0" y="4920618"/>
+                  </a:lnTo>
+                  <a:lnTo>
+                    <a:pt x="0" y="3760303"/>
+                  </a:lnTo>
+                  <a:lnTo>
+                    <a:pt x="80488" y="3974159"/>
+                  </a:lnTo>
+                  <a:cubicBezTo>
+                    <a:pt x="217875" y="4289243"/>
+                    <a:pt x="414383" y="4571632"/>
+                    <a:pt x="664748" y="4813600"/>
+                  </a:cubicBezTo>
+                  <a:cubicBezTo>
+                    <a:pt x="1169734" y="5301566"/>
+                    <a:pt x="1838644" y="5570406"/>
+                    <a:pt x="2548087" y="5570406"/>
+                  </a:cubicBezTo>
+                  <a:cubicBezTo>
+                    <a:pt x="2928786" y="5570406"/>
+                    <a:pt x="3252156" y="5516996"/>
+                    <a:pt x="3536561" y="5407153"/>
+                  </a:cubicBezTo>
+                  <a:cubicBezTo>
+                    <a:pt x="3815366" y="5299438"/>
+                    <a:pt x="4067747" y="5132603"/>
+                    <a:pt x="4308035" y="4897241"/>
+                  </a:cubicBezTo>
+                  <a:cubicBezTo>
+                    <a:pt x="4475095" y="4733653"/>
+                    <a:pt x="4533767" y="4637358"/>
+                    <a:pt x="4569038" y="4564802"/>
+                  </a:cubicBezTo>
+                  <a:cubicBezTo>
+                    <a:pt x="4619313" y="4461453"/>
+                    <a:pt x="4652792" y="4330784"/>
+                    <a:pt x="4699147" y="4149952"/>
+                  </a:cubicBezTo>
+                  <a:cubicBezTo>
+                    <a:pt x="4758491" y="3918846"/>
+                    <a:pt x="4839558" y="3602194"/>
+                    <a:pt x="5003034" y="3168421"/>
+                  </a:cubicBezTo>
+                  <a:cubicBezTo>
+                    <a:pt x="5103024" y="2902940"/>
+                    <a:pt x="5100112" y="2626037"/>
+                    <a:pt x="4994189" y="2321590"/>
+                  </a:cubicBezTo>
+                  <a:cubicBezTo>
+                    <a:pt x="4900470" y="2052526"/>
+                    <a:pt x="4725460" y="1769129"/>
+                    <a:pt x="4487860" y="1501856"/>
+                  </a:cubicBezTo>
+                  <a:cubicBezTo>
+                    <a:pt x="4210285" y="1189683"/>
+                    <a:pt x="3933047" y="962832"/>
+                    <a:pt x="3640469" y="808425"/>
+                  </a:cubicBezTo>
+                  <a:cubicBezTo>
+                    <a:pt x="3323369" y="641141"/>
+                    <a:pt x="2988578" y="559851"/>
+                    <a:pt x="2616837" y="559851"/>
+                  </a:cubicBezTo>
+                  <a:cubicBezTo>
+                    <a:pt x="2315413" y="559851"/>
+                    <a:pt x="2044110" y="640134"/>
+                    <a:pt x="1762952" y="812008"/>
+                  </a:cubicBezTo>
+                  <a:cubicBezTo>
+                    <a:pt x="1472838" y="989593"/>
+                    <a:pt x="1197167" y="1250707"/>
+                    <a:pt x="939635" y="1502976"/>
+                  </a:cubicBezTo>
+                  <a:cubicBezTo>
+                    <a:pt x="819379" y="1620769"/>
+                    <a:pt x="700355" y="1727700"/>
+                    <a:pt x="585250" y="1831049"/>
+                  </a:cubicBezTo>
+                  <a:cubicBezTo>
+                    <a:pt x="362317" y="2031140"/>
+                    <a:pt x="169840" y="2204022"/>
+                    <a:pt x="40403" y="2389556"/>
+                  </a:cubicBezTo>
+                  <a:lnTo>
+                    <a:pt x="0" y="2456747"/>
+                  </a:lnTo>
+                  <a:lnTo>
+                    <a:pt x="0" y="1601114"/>
+                  </a:lnTo>
+                  <a:lnTo>
+                    <a:pt x="93200" y="1513741"/>
+                  </a:lnTo>
+                  <a:cubicBezTo>
+                    <a:pt x="237107" y="1383294"/>
+                    <a:pt x="388238" y="1251435"/>
+                    <a:pt x="535423" y="1107273"/>
+                  </a:cubicBezTo>
+                  <a:cubicBezTo>
+                    <a:pt x="1124050" y="530627"/>
+                    <a:pt x="1718500" y="0"/>
+                    <a:pt x="2616837" y="0"/>
+                  </a:cubicBezTo>
+                  <a:close/>
+                </a:path>
+              </a:pathLst>
+            </a:custGeom>
+            <a:gradFill>
+              <a:gsLst>
+                <a:gs pos="2000">
+                  <a:schemeClr val="bg1">
+                    <a:alpha val="10000"/>
+                  </a:schemeClr>
+                </a:gs>
+                <a:gs pos="16000">
+                  <a:schemeClr val="accent6">
+                    <a:alpha val="10000"/>
+                  </a:schemeClr>
+                </a:gs>
+                <a:gs pos="100000">
+                  <a:schemeClr val="bg1">
+                    <a:alpha val="10000"/>
+                  </a:schemeClr>
+                </a:gs>
+                <a:gs pos="85000">
+                  <a:schemeClr val="accent1">
+                    <a:alpha val="10000"/>
+                  </a:schemeClr>
+                </a:gs>
+              </a:gsLst>
+              <a:lin ang="12000000" scaled="0"/>
+            </a:gradFill>
+            <a:ln>
+              <a:noFill/>
+            </a:ln>
+          </p:spPr>
+          <p:style>
+            <a:lnRef idx="2">
+              <a:schemeClr val="accent1">
+                <a:shade val="50000"/>
+              </a:schemeClr>
+            </a:lnRef>
+            <a:fillRef idx="1">
+              <a:schemeClr val="accent1"/>
+            </a:fillRef>
+            <a:effectRef idx="0">
+              <a:schemeClr val="accent1"/>
+            </a:effectRef>
+            <a:fontRef idx="minor">
+              <a:schemeClr val="lt1"/>
+            </a:fontRef>
+          </p:style>
+          <p:txBody>
+            <a:bodyPr wrap="square" rtlCol="0" anchor="ctr">
+              <a:noAutofit/>
+            </a:bodyPr>
+            <a:lstStyle/>
+            <a:p>
+              <a:pPr algn="ctr"/>
+              <a:endParaRPr lang="en-US"/>
+            </a:p>
+          </p:txBody>
+        </p:sp>
+        <p:sp>
+          <p:nvSpPr>
+            <p:cNvPr id="36" name="Freeform: Shape 21">
+              <a:extLst>
+                <a:ext uri="{FF2B5EF4-FFF2-40B4-BE49-F238E27FC236}">
+                  <a16:creationId xmlns:a16="http://schemas.microsoft.com/office/drawing/2014/main" id="{B0436CEA-83DB-4E89-8B52-8D9168AD5061}"/>
+                </a:ext>
+                <a:ext uri="{C183D7F6-B498-43B3-948B-1728B52AA6E4}">
+                  <adec:decorative xmlns:adec="http://schemas.microsoft.com/office/drawing/2017/decorative" val="1"/>
+                </a:ext>
+              </a:extLst>
+            </p:cNvPr>
+            <p:cNvSpPr/>
+            <p:nvPr>
+              <p:extLst>
+                <p:ext uri="{386F3935-93C4-4BCD-93E2-E3B085C9AB24}">
+                  <p16:designElem xmlns:p16="http://schemas.microsoft.com/office/powerpoint/2015/main" val="1"/>
+                </p:ext>
+              </p:extLst>
+            </p:nvPr>
+          </p:nvSpPr>
+          <p:spPr>
+            <a:xfrm>
+              <a:off x="-19221" y="176241"/>
+              <a:ext cx="5517522" cy="6130481"/>
+            </a:xfrm>
+            <a:custGeom>
+              <a:avLst/>
+              <a:gdLst>
+                <a:gd name="connsiteX0" fmla="*/ 2549095 w 5517522"/>
+                <a:gd name="connsiteY0" fmla="*/ 0 h 6130481"/>
+                <a:gd name="connsiteX1" fmla="*/ 4804175 w 5517522"/>
+                <a:gd name="connsiteY1" fmla="*/ 1134258 h 6130481"/>
+                <a:gd name="connsiteX2" fmla="*/ 5411838 w 5517522"/>
+                <a:gd name="connsiteY2" fmla="*/ 3362353 h 6130481"/>
+                <a:gd name="connsiteX3" fmla="*/ 4601621 w 5517522"/>
+                <a:gd name="connsiteY3" fmla="*/ 5293280 h 6130481"/>
+                <a:gd name="connsiteX4" fmla="*/ 2481577 w 5517522"/>
+                <a:gd name="connsiteY4" fmla="*/ 6130481 h 6130481"/>
+                <a:gd name="connsiteX5" fmla="*/ 243517 w 5517522"/>
+                <a:gd name="connsiteY5" fmla="*/ 5212325 h 6130481"/>
+                <a:gd name="connsiteX6" fmla="*/ 34587 w 5517522"/>
+                <a:gd name="connsiteY6" fmla="*/ 4985345 h 6130481"/>
+                <a:gd name="connsiteX7" fmla="*/ 0 w 5517522"/>
+                <a:gd name="connsiteY7" fmla="*/ 4939620 h 6130481"/>
+                <a:gd name="connsiteX8" fmla="*/ 0 w 5517522"/>
+                <a:gd name="connsiteY8" fmla="*/ 3335329 h 6130481"/>
+                <a:gd name="connsiteX9" fmla="*/ 17141 w 5517522"/>
+                <a:gd name="connsiteY9" fmla="*/ 3448738 h 6130481"/>
+                <a:gd name="connsiteX10" fmla="*/ 167489 w 5517522"/>
+                <a:gd name="connsiteY10" fmla="*/ 3930490 h 6130481"/>
+                <a:gd name="connsiteX11" fmla="*/ 715471 w 5517522"/>
+                <a:gd name="connsiteY11" fmla="*/ 4734212 h 6130481"/>
+                <a:gd name="connsiteX12" fmla="*/ 2481689 w 5517522"/>
+                <a:gd name="connsiteY12" fmla="*/ 5458772 h 6130481"/>
+                <a:gd name="connsiteX13" fmla="*/ 4126644 w 5517522"/>
+                <a:gd name="connsiteY13" fmla="*/ 4818302 h 6130481"/>
+                <a:gd name="connsiteX14" fmla="*/ 4360437 w 5517522"/>
+                <a:gd name="connsiteY14" fmla="*/ 4516766 h 6130481"/>
+                <a:gd name="connsiteX15" fmla="*/ 4480357 w 5517522"/>
+                <a:gd name="connsiteY15" fmla="*/ 4122855 h 6130481"/>
+                <a:gd name="connsiteX16" fmla="*/ 4781557 w 5517522"/>
+                <a:gd name="connsiteY16" fmla="*/ 3129791 h 6130481"/>
+                <a:gd name="connsiteX17" fmla="*/ 4771928 w 5517522"/>
+                <a:gd name="connsiteY17" fmla="*/ 2357869 h 6130481"/>
+                <a:gd name="connsiteX18" fmla="*/ 4297510 w 5517522"/>
+                <a:gd name="connsiteY18" fmla="*/ 1575533 h 6130481"/>
+                <a:gd name="connsiteX19" fmla="*/ 3498715 w 5517522"/>
+                <a:gd name="connsiteY19" fmla="*/ 907071 h 6130481"/>
+                <a:gd name="connsiteX20" fmla="*/ 2549095 w 5517522"/>
+                <a:gd name="connsiteY20" fmla="*/ 671821 h 6130481"/>
+                <a:gd name="connsiteX21" fmla="*/ 985319 w 5517522"/>
+                <a:gd name="connsiteY21" fmla="*/ 1582475 h 6130481"/>
+                <a:gd name="connsiteX22" fmla="*/ 634628 w 5517522"/>
+                <a:gd name="connsiteY22" fmla="*/ 1913907 h 6130481"/>
+                <a:gd name="connsiteX23" fmla="*/ 117662 w 5517522"/>
+                <a:gd name="connsiteY23" fmla="*/ 2453044 h 6130481"/>
+                <a:gd name="connsiteX24" fmla="*/ 2515 w 5517522"/>
+                <a:gd name="connsiteY24" fmla="*/ 2685494 h 6130481"/>
+                <a:gd name="connsiteX25" fmla="*/ 0 w 5517522"/>
+                <a:gd name="connsiteY25" fmla="*/ 2696965 h 6130481"/>
+                <a:gd name="connsiteX26" fmla="*/ 0 w 5517522"/>
+                <a:gd name="connsiteY26" fmla="*/ 1587383 h 6130481"/>
+                <a:gd name="connsiteX27" fmla="*/ 76951 w 5517522"/>
+                <a:gd name="connsiteY27" fmla="*/ 1513741 h 6130481"/>
+                <a:gd name="connsiteX28" fmla="*/ 510118 w 5517522"/>
+                <a:gd name="connsiteY28" fmla="*/ 1107273 h 6130481"/>
+                <a:gd name="connsiteX29" fmla="*/ 2549095 w 5517522"/>
+                <a:gd name="connsiteY29" fmla="*/ 0 h 6130481"/>
+              </a:gdLst>
+              <a:ahLst/>
+              <a:cxnLst>
+                <a:cxn ang="0">
+                  <a:pos x="connsiteX0" y="connsiteY0"/>
+                </a:cxn>
+                <a:cxn ang="0">
+                  <a:pos x="connsiteX1" y="connsiteY1"/>
+                </a:cxn>
+                <a:cxn ang="0">
+                  <a:pos x="connsiteX2" y="connsiteY2"/>
+                </a:cxn>
+                <a:cxn ang="0">
+                  <a:pos x="connsiteX3" y="connsiteY3"/>
+                </a:cxn>
+                <a:cxn ang="0">
+                  <a:pos x="connsiteX4" y="connsiteY4"/>
+                </a:cxn>
+                <a:cxn ang="0">
+                  <a:pos x="connsiteX5" y="connsiteY5"/>
+                </a:cxn>
+                <a:cxn ang="0">
+                  <a:pos x="connsiteX6" y="connsiteY6"/>
+                </a:cxn>
+                <a:cxn ang="0">
+                  <a:pos x="connsiteX7" y="connsiteY7"/>
+                </a:cxn>
+                <a:cxn ang="0">
+                  <a:pos x="connsiteX8" y="connsiteY8"/>
+                </a:cxn>
+                <a:cxn ang="0">
+                  <a:pos x="connsiteX9" y="connsiteY9"/>
+                </a:cxn>
+                <a:cxn ang="0">
+                  <a:pos x="connsiteX10" y="connsiteY10"/>
+                </a:cxn>
+                <a:cxn ang="0">
+                  <a:pos x="connsiteX11" y="connsiteY11"/>
+                </a:cxn>
+                <a:cxn ang="0">
+                  <a:pos x="connsiteX12" y="connsiteY12"/>
+                </a:cxn>
+                <a:cxn ang="0">
+                  <a:pos x="connsiteX13" y="connsiteY13"/>
+                </a:cxn>
+                <a:cxn ang="0">
+                  <a:pos x="connsiteX14" y="connsiteY14"/>
+                </a:cxn>
+                <a:cxn ang="0">
+                  <a:pos x="connsiteX15" y="connsiteY15"/>
+                </a:cxn>
+                <a:cxn ang="0">
+                  <a:pos x="connsiteX16" y="connsiteY16"/>
+                </a:cxn>
+                <a:cxn ang="0">
+                  <a:pos x="connsiteX17" y="connsiteY17"/>
+                </a:cxn>
+                <a:cxn ang="0">
+                  <a:pos x="connsiteX18" y="connsiteY18"/>
+                </a:cxn>
+                <a:cxn ang="0">
+                  <a:pos x="connsiteX19" y="connsiteY19"/>
+                </a:cxn>
+                <a:cxn ang="0">
+                  <a:pos x="connsiteX20" y="connsiteY20"/>
+                </a:cxn>
+                <a:cxn ang="0">
+                  <a:pos x="connsiteX21" y="connsiteY21"/>
+                </a:cxn>
+                <a:cxn ang="0">
+                  <a:pos x="connsiteX22" y="connsiteY22"/>
+                </a:cxn>
+                <a:cxn ang="0">
+                  <a:pos x="connsiteX23" y="connsiteY23"/>
+                </a:cxn>
+                <a:cxn ang="0">
+                  <a:pos x="connsiteX24" y="connsiteY24"/>
+                </a:cxn>
+                <a:cxn ang="0">
+                  <a:pos x="connsiteX25" y="connsiteY25"/>
+                </a:cxn>
+                <a:cxn ang="0">
+                  <a:pos x="connsiteX26" y="connsiteY26"/>
+                </a:cxn>
+                <a:cxn ang="0">
+                  <a:pos x="connsiteX27" y="connsiteY27"/>
+                </a:cxn>
+                <a:cxn ang="0">
+                  <a:pos x="connsiteX28" y="connsiteY28"/>
+                </a:cxn>
+                <a:cxn ang="0">
+                  <a:pos x="connsiteX29" y="connsiteY29"/>
+                </a:cxn>
+              </a:cxnLst>
+              <a:rect l="l" t="t" r="r" b="b"/>
+              <a:pathLst>
+                <a:path w="5517522" h="6130481">
+                  <a:moveTo>
+                    <a:pt x="2549095" y="0"/>
+                  </a:moveTo>
+                  <a:cubicBezTo>
+                    <a:pt x="3508568" y="0"/>
+                    <a:pt x="4219915" y="463445"/>
+                    <a:pt x="4804175" y="1134258"/>
+                  </a:cubicBezTo>
+                  <a:cubicBezTo>
+                    <a:pt x="5291694" y="1694109"/>
+                    <a:pt x="5724011" y="2516643"/>
+                    <a:pt x="5411838" y="3362353"/>
+                  </a:cubicBezTo>
+                  <a:cubicBezTo>
+                    <a:pt x="4993181" y="4496612"/>
+                    <a:pt x="5178268" y="4716633"/>
+                    <a:pt x="4601621" y="5293280"/>
+                  </a:cubicBezTo>
+                  <a:cubicBezTo>
+                    <a:pt x="4024863" y="5869926"/>
+                    <a:pt x="3361551" y="6130481"/>
+                    <a:pt x="2481577" y="6130481"/>
+                  </a:cubicBezTo>
+                  <a:cubicBezTo>
+                    <a:pt x="1609329" y="6130481"/>
+                    <a:pt x="818932" y="5780127"/>
+                    <a:pt x="243517" y="5212325"/>
+                  </a:cubicBezTo>
+                  <a:cubicBezTo>
+                    <a:pt x="170302" y="5140091"/>
+                    <a:pt x="100568" y="5064339"/>
+                    <a:pt x="34587" y="4985345"/>
+                  </a:cubicBezTo>
+                  <a:lnTo>
+                    <a:pt x="0" y="4939620"/>
+                  </a:lnTo>
+                  <a:lnTo>
+                    <a:pt x="0" y="3335329"/>
+                  </a:lnTo>
+                  <a:lnTo>
+                    <a:pt x="17141" y="3448738"/>
+                  </a:lnTo>
+                  <a:cubicBezTo>
+                    <a:pt x="50676" y="3613558"/>
+                    <a:pt x="100867" y="3774516"/>
+                    <a:pt x="167489" y="3930490"/>
+                  </a:cubicBezTo>
+                  <a:cubicBezTo>
+                    <a:pt x="296255" y="4232138"/>
+                    <a:pt x="480670" y="4502546"/>
+                    <a:pt x="715471" y="4734212"/>
+                  </a:cubicBezTo>
+                  <a:cubicBezTo>
+                    <a:pt x="1188993" y="5201464"/>
+                    <a:pt x="1816250" y="5458772"/>
+                    <a:pt x="2481689" y="5458772"/>
+                  </a:cubicBezTo>
+                  <a:cubicBezTo>
+                    <a:pt x="3185758" y="5458772"/>
+                    <a:pt x="3677755" y="5267191"/>
+                    <a:pt x="4126644" y="4818302"/>
+                  </a:cubicBezTo>
+                  <a:cubicBezTo>
+                    <a:pt x="4278363" y="4666583"/>
+                    <a:pt x="4329982" y="4580701"/>
+                    <a:pt x="4360437" y="4516766"/>
+                  </a:cubicBezTo>
+                  <a:cubicBezTo>
+                    <a:pt x="4404890" y="4423495"/>
+                    <a:pt x="4436577" y="4297417"/>
+                    <a:pt x="4480357" y="4122855"/>
+                  </a:cubicBezTo>
+                  <a:cubicBezTo>
+                    <a:pt x="4539030" y="3889285"/>
+                    <a:pt x="4619425" y="3569275"/>
+                    <a:pt x="4781557" y="3129791"/>
+                  </a:cubicBezTo>
+                  <a:cubicBezTo>
+                    <a:pt x="4870238" y="2889503"/>
+                    <a:pt x="4867103" y="2637010"/>
+                    <a:pt x="4771928" y="2357869"/>
+                  </a:cubicBezTo>
+                  <a:cubicBezTo>
+                    <a:pt x="4684815" y="2102465"/>
+                    <a:pt x="4520779" y="1831945"/>
+                    <a:pt x="4297510" y="1575533"/>
+                  </a:cubicBezTo>
+                  <a:cubicBezTo>
+                    <a:pt x="4034492" y="1273549"/>
+                    <a:pt x="3773266" y="1054983"/>
+                    <a:pt x="3498715" y="907071"/>
+                  </a:cubicBezTo>
+                  <a:cubicBezTo>
+                    <a:pt x="3204905" y="748745"/>
+                    <a:pt x="2894187" y="671821"/>
+                    <a:pt x="2549095" y="671821"/>
+                  </a:cubicBezTo>
+                  <a:cubicBezTo>
+                    <a:pt x="1942553" y="671821"/>
+                    <a:pt x="1518298" y="1049273"/>
+                    <a:pt x="985319" y="1582475"/>
+                  </a:cubicBezTo>
+                  <a:cubicBezTo>
+                    <a:pt x="865735" y="1702059"/>
+                    <a:pt x="748278" y="1809774"/>
+                    <a:pt x="634628" y="1913907"/>
+                  </a:cubicBezTo>
+                  <a:cubicBezTo>
+                    <a:pt x="421325" y="2109407"/>
+                    <a:pt x="237134" y="2278146"/>
+                    <a:pt x="117662" y="2453044"/>
+                  </a:cubicBezTo>
+                  <a:cubicBezTo>
+                    <a:pt x="64756" y="2530415"/>
+                    <a:pt x="27022" y="2605799"/>
+                    <a:pt x="2515" y="2685494"/>
+                  </a:cubicBezTo>
+                  <a:lnTo>
+                    <a:pt x="0" y="2696965"/>
+                  </a:lnTo>
+                  <a:lnTo>
+                    <a:pt x="0" y="1587383"/>
+                  </a:lnTo>
+                  <a:lnTo>
+                    <a:pt x="76951" y="1513741"/>
+                  </a:lnTo>
+                  <a:cubicBezTo>
+                    <a:pt x="217918" y="1383294"/>
+                    <a:pt x="365956" y="1251435"/>
+                    <a:pt x="510118" y="1107273"/>
+                  </a:cubicBezTo>
+                  <a:cubicBezTo>
+                    <a:pt x="1086764" y="530627"/>
+                    <a:pt x="1669121" y="0"/>
+                    <a:pt x="2549095" y="0"/>
+                  </a:cubicBezTo>
+                  <a:close/>
+                </a:path>
+              </a:pathLst>
+            </a:custGeom>
+            <a:gradFill>
+              <a:gsLst>
+                <a:gs pos="2000">
+                  <a:schemeClr val="bg1">
+                    <a:alpha val="10000"/>
+                  </a:schemeClr>
+                </a:gs>
+                <a:gs pos="16000">
+                  <a:schemeClr val="accent6">
+                    <a:alpha val="10000"/>
+                  </a:schemeClr>
+                </a:gs>
+                <a:gs pos="100000">
+                  <a:schemeClr val="bg1">
+                    <a:alpha val="10000"/>
+                  </a:schemeClr>
+                </a:gs>
+                <a:gs pos="85000">
+                  <a:schemeClr val="accent1">
+                    <a:alpha val="10000"/>
+                  </a:schemeClr>
+                </a:gs>
+              </a:gsLst>
+              <a:lin ang="12000000" scaled="0"/>
+            </a:gradFill>
+            <a:ln>
+              <a:noFill/>
+            </a:ln>
+          </p:spPr>
+          <p:style>
+            <a:lnRef idx="2">
+              <a:schemeClr val="accent1">
+                <a:shade val="50000"/>
+              </a:schemeClr>
+            </a:lnRef>
+            <a:fillRef idx="1">
+              <a:schemeClr val="accent1"/>
+            </a:fillRef>
+            <a:effectRef idx="0">
+              <a:schemeClr val="accent1"/>
+            </a:effectRef>
+            <a:fontRef idx="minor">
+              <a:schemeClr val="lt1"/>
+            </a:fontRef>
+          </p:style>
+          <p:txBody>
+            <a:bodyPr wrap="square" rtlCol="0" anchor="ctr">
+              <a:noAutofit/>
+            </a:bodyPr>
+            <a:lstStyle/>
+            <a:p>
+              <a:pPr algn="ctr"/>
+              <a:endParaRPr lang="en-US"/>
+            </a:p>
+          </p:txBody>
+        </p:sp>
+        <p:sp>
+          <p:nvSpPr>
+            <p:cNvPr id="37" name="Freeform: Shape 22">
+              <a:extLst>
+                <a:ext uri="{FF2B5EF4-FFF2-40B4-BE49-F238E27FC236}">
+                  <a16:creationId xmlns:a16="http://schemas.microsoft.com/office/drawing/2014/main" id="{200AFA37-9373-4E36-8BDE-B16B2486C9D9}"/>
+                </a:ext>
+                <a:ext uri="{C183D7F6-B498-43B3-948B-1728B52AA6E4}">
+                  <adec:decorative xmlns:adec="http://schemas.microsoft.com/office/drawing/2017/decorative" val="1"/>
+                </a:ext>
+              </a:extLst>
+            </p:cNvPr>
+            <p:cNvSpPr/>
+            <p:nvPr>
+              <p:extLst>
+                <p:ext uri="{386F3935-93C4-4BCD-93E2-E3B085C9AB24}">
+                  <p16:designElem xmlns:p16="http://schemas.microsoft.com/office/powerpoint/2015/main" val="1"/>
+                </p:ext>
+              </p:extLst>
+            </p:nvPr>
+          </p:nvSpPr>
+          <p:spPr>
+            <a:xfrm>
+              <a:off x="-19221" y="0"/>
+              <a:ext cx="5646974" cy="6483075"/>
+            </a:xfrm>
+            <a:custGeom>
+              <a:avLst/>
+              <a:gdLst>
+                <a:gd name="connsiteX0" fmla="*/ 2405773 w 5646974"/>
+                <a:gd name="connsiteY0" fmla="*/ 0 h 6483075"/>
+                <a:gd name="connsiteX1" fmla="*/ 5646974 w 5646974"/>
+                <a:gd name="connsiteY1" fmla="*/ 3241538 h 6483075"/>
+                <a:gd name="connsiteX2" fmla="*/ 2405773 w 5646974"/>
+                <a:gd name="connsiteY2" fmla="*/ 6483075 h 6483075"/>
+                <a:gd name="connsiteX3" fmla="*/ 113897 w 5646974"/>
+                <a:gd name="connsiteY3" fmla="*/ 5533666 h 6483075"/>
+                <a:gd name="connsiteX4" fmla="*/ 0 w 5646974"/>
+                <a:gd name="connsiteY4" fmla="*/ 5408336 h 6483075"/>
+                <a:gd name="connsiteX5" fmla="*/ 0 w 5646974"/>
+                <a:gd name="connsiteY5" fmla="*/ 4983659 h 6483075"/>
+                <a:gd name="connsiteX6" fmla="*/ 155731 w 5646974"/>
+                <a:gd name="connsiteY6" fmla="*/ 5176047 h 6483075"/>
+                <a:gd name="connsiteX7" fmla="*/ 1093706 w 5646974"/>
+                <a:gd name="connsiteY7" fmla="*/ 5866903 h 6483075"/>
+                <a:gd name="connsiteX8" fmla="*/ 1639673 w 5646974"/>
+                <a:gd name="connsiteY8" fmla="*/ 6059940 h 6483075"/>
+                <a:gd name="connsiteX9" fmla="*/ 1709990 w 5646974"/>
+                <a:gd name="connsiteY9" fmla="*/ 6076287 h 6483075"/>
+                <a:gd name="connsiteX10" fmla="*/ 1780307 w 5646974"/>
+                <a:gd name="connsiteY10" fmla="*/ 6091963 h 6483075"/>
+                <a:gd name="connsiteX11" fmla="*/ 1851072 w 5646974"/>
+                <a:gd name="connsiteY11" fmla="*/ 6105176 h 6483075"/>
+                <a:gd name="connsiteX12" fmla="*/ 1886455 w 5646974"/>
+                <a:gd name="connsiteY12" fmla="*/ 6111782 h 6483075"/>
+                <a:gd name="connsiteX13" fmla="*/ 1921949 w 5646974"/>
+                <a:gd name="connsiteY13" fmla="*/ 6117716 h 6483075"/>
+                <a:gd name="connsiteX14" fmla="*/ 2064152 w 5646974"/>
+                <a:gd name="connsiteY14" fmla="*/ 6137647 h 6483075"/>
+                <a:gd name="connsiteX15" fmla="*/ 2206914 w 5646974"/>
+                <a:gd name="connsiteY15" fmla="*/ 6151195 h 6483075"/>
+                <a:gd name="connsiteX16" fmla="*/ 2350011 w 5646974"/>
+                <a:gd name="connsiteY16" fmla="*/ 6158250 h 6483075"/>
+                <a:gd name="connsiteX17" fmla="*/ 2493109 w 5646974"/>
+                <a:gd name="connsiteY17" fmla="*/ 6159705 h 6483075"/>
+                <a:gd name="connsiteX18" fmla="*/ 2781321 w 5646974"/>
+                <a:gd name="connsiteY18" fmla="*/ 6147277 h 6483075"/>
+                <a:gd name="connsiteX19" fmla="*/ 3345091 w 5646974"/>
+                <a:gd name="connsiteY19" fmla="*/ 6060276 h 6483075"/>
+                <a:gd name="connsiteX20" fmla="*/ 3878853 w 5646974"/>
+                <a:gd name="connsiteY20" fmla="*/ 5871718 h 6483075"/>
+                <a:gd name="connsiteX21" fmla="*/ 4367267 w 5646974"/>
+                <a:gd name="connsiteY21" fmla="*/ 5573093 h 6483075"/>
+                <a:gd name="connsiteX22" fmla="*/ 4424484 w 5646974"/>
+                <a:gd name="connsiteY22" fmla="*/ 5528529 h 6483075"/>
+                <a:gd name="connsiteX23" fmla="*/ 4481252 w 5646974"/>
+                <a:gd name="connsiteY23" fmla="*/ 5483069 h 6483075"/>
+                <a:gd name="connsiteX24" fmla="*/ 4536790 w 5646974"/>
+                <a:gd name="connsiteY24" fmla="*/ 5435818 h 6483075"/>
+                <a:gd name="connsiteX25" fmla="*/ 4591543 w 5646974"/>
+                <a:gd name="connsiteY25" fmla="*/ 5387671 h 6483075"/>
+                <a:gd name="connsiteX26" fmla="*/ 4794209 w 5646974"/>
+                <a:gd name="connsiteY26" fmla="*/ 5181198 h 6483075"/>
+                <a:gd name="connsiteX27" fmla="*/ 4956678 w 5646974"/>
+                <a:gd name="connsiteY27" fmla="*/ 4945836 h 6483075"/>
+                <a:gd name="connsiteX28" fmla="*/ 4989262 w 5646974"/>
+                <a:gd name="connsiteY28" fmla="*/ 4881453 h 6483075"/>
+                <a:gd name="connsiteX29" fmla="*/ 5017814 w 5646974"/>
+                <a:gd name="connsiteY29" fmla="*/ 4814607 h 6483075"/>
+                <a:gd name="connsiteX30" fmla="*/ 5044127 w 5646974"/>
+                <a:gd name="connsiteY30" fmla="*/ 4746193 h 6483075"/>
+                <a:gd name="connsiteX31" fmla="*/ 5068425 w 5646974"/>
+                <a:gd name="connsiteY31" fmla="*/ 4676436 h 6483075"/>
+                <a:gd name="connsiteX32" fmla="*/ 5154641 w 5646974"/>
+                <a:gd name="connsiteY32" fmla="*/ 4390352 h 6483075"/>
+                <a:gd name="connsiteX33" fmla="*/ 5196854 w 5646974"/>
+                <a:gd name="connsiteY33" fmla="*/ 4246134 h 6483075"/>
+                <a:gd name="connsiteX34" fmla="*/ 5240299 w 5646974"/>
+                <a:gd name="connsiteY34" fmla="*/ 4102140 h 6483075"/>
+                <a:gd name="connsiteX35" fmla="*/ 5432440 w 5646974"/>
+                <a:gd name="connsiteY35" fmla="*/ 3532884 h 6483075"/>
+                <a:gd name="connsiteX36" fmla="*/ 5528846 w 5646974"/>
+                <a:gd name="connsiteY36" fmla="*/ 2951647 h 6483075"/>
+                <a:gd name="connsiteX37" fmla="*/ 5495927 w 5646974"/>
+                <a:gd name="connsiteY37" fmla="*/ 2658733 h 6483075"/>
+                <a:gd name="connsiteX38" fmla="*/ 5480027 w 5646974"/>
+                <a:gd name="connsiteY38" fmla="*/ 2586848 h 6483075"/>
+                <a:gd name="connsiteX39" fmla="*/ 5461328 w 5646974"/>
+                <a:gd name="connsiteY39" fmla="*/ 2515635 h 6483075"/>
+                <a:gd name="connsiteX40" fmla="*/ 5439605 w 5646974"/>
+                <a:gd name="connsiteY40" fmla="*/ 2445317 h 6483075"/>
+                <a:gd name="connsiteX41" fmla="*/ 5415532 w 5646974"/>
+                <a:gd name="connsiteY41" fmla="*/ 2375896 h 6483075"/>
+                <a:gd name="connsiteX42" fmla="*/ 5144564 w 5646974"/>
+                <a:gd name="connsiteY42" fmla="*/ 1857138 h 6483075"/>
+                <a:gd name="connsiteX43" fmla="*/ 4774838 w 5646974"/>
+                <a:gd name="connsiteY43" fmla="*/ 1405450 h 6483075"/>
+                <a:gd name="connsiteX44" fmla="*/ 4345769 w 5646974"/>
+                <a:gd name="connsiteY44" fmla="*/ 1012323 h 6483075"/>
+                <a:gd name="connsiteX45" fmla="*/ 4115334 w 5646974"/>
+                <a:gd name="connsiteY45" fmla="*/ 841344 h 6483075"/>
+                <a:gd name="connsiteX46" fmla="*/ 3874038 w 5646974"/>
+                <a:gd name="connsiteY46" fmla="*/ 691528 h 6483075"/>
+                <a:gd name="connsiteX47" fmla="*/ 3359535 w 5646974"/>
+                <a:gd name="connsiteY47" fmla="*/ 468819 h 6483075"/>
+                <a:gd name="connsiteX48" fmla="*/ 2811105 w 5646974"/>
+                <a:gd name="connsiteY48" fmla="*/ 366031 h 6483075"/>
+                <a:gd name="connsiteX49" fmla="*/ 2741124 w 5646974"/>
+                <a:gd name="connsiteY49" fmla="*/ 361440 h 6483075"/>
+                <a:gd name="connsiteX50" fmla="*/ 2671030 w 5646974"/>
+                <a:gd name="connsiteY50" fmla="*/ 358417 h 6483075"/>
+                <a:gd name="connsiteX51" fmla="*/ 2600713 w 5646974"/>
+                <a:gd name="connsiteY51" fmla="*/ 357521 h 6483075"/>
+                <a:gd name="connsiteX52" fmla="*/ 2531739 w 5646974"/>
+                <a:gd name="connsiteY52" fmla="*/ 358529 h 6483075"/>
+                <a:gd name="connsiteX53" fmla="*/ 2259988 w 5646974"/>
+                <a:gd name="connsiteY53" fmla="*/ 385289 h 6483075"/>
+                <a:gd name="connsiteX54" fmla="*/ 1740670 w 5646974"/>
+                <a:gd name="connsiteY54" fmla="*/ 553917 h 6483075"/>
+                <a:gd name="connsiteX55" fmla="*/ 1264124 w 5646974"/>
+                <a:gd name="connsiteY55" fmla="*/ 853549 h 6483075"/>
+                <a:gd name="connsiteX56" fmla="*/ 823074 w 5646974"/>
+                <a:gd name="connsiteY56" fmla="*/ 1234136 h 6483075"/>
+                <a:gd name="connsiteX57" fmla="*/ 715694 w 5646974"/>
+                <a:gd name="connsiteY57" fmla="*/ 1336252 h 6483075"/>
+                <a:gd name="connsiteX58" fmla="*/ 606859 w 5646974"/>
+                <a:gd name="connsiteY58" fmla="*/ 1440945 h 6483075"/>
+                <a:gd name="connsiteX59" fmla="*/ 382023 w 5646974"/>
+                <a:gd name="connsiteY59" fmla="*/ 1646074 h 6483075"/>
+                <a:gd name="connsiteX60" fmla="*/ 158531 w 5646974"/>
+                <a:gd name="connsiteY60" fmla="*/ 1843813 h 6483075"/>
+                <a:gd name="connsiteX61" fmla="*/ 0 w 5646974"/>
+                <a:gd name="connsiteY61" fmla="*/ 1991775 h 6483075"/>
+                <a:gd name="connsiteX62" fmla="*/ 0 w 5646974"/>
+                <a:gd name="connsiteY62" fmla="*/ 1074740 h 6483075"/>
+                <a:gd name="connsiteX63" fmla="*/ 113897 w 5646974"/>
+                <a:gd name="connsiteY63" fmla="*/ 949410 h 6483075"/>
+                <a:gd name="connsiteX64" fmla="*/ 2405773 w 5646974"/>
+                <a:gd name="connsiteY64" fmla="*/ 0 h 6483075"/>
+              </a:gdLst>
+              <a:ahLst/>
+              <a:cxnLst>
+                <a:cxn ang="0">
+                  <a:pos x="connsiteX0" y="connsiteY0"/>
+                </a:cxn>
+                <a:cxn ang="0">
+                  <a:pos x="connsiteX1" y="connsiteY1"/>
+                </a:cxn>
+                <a:cxn ang="0">
+                  <a:pos x="connsiteX2" y="connsiteY2"/>
+                </a:cxn>
+                <a:cxn ang="0">
+                  <a:pos x="connsiteX3" y="connsiteY3"/>
+                </a:cxn>
+                <a:cxn ang="0">
+                  <a:pos x="connsiteX4" y="connsiteY4"/>
+                </a:cxn>
+                <a:cxn ang="0">
+                  <a:pos x="connsiteX5" y="connsiteY5"/>
+                </a:cxn>
+                <a:cxn ang="0">
+                  <a:pos x="connsiteX6" y="connsiteY6"/>
+                </a:cxn>
+                <a:cxn ang="0">
+                  <a:pos x="connsiteX7" y="connsiteY7"/>
+                </a:cxn>
+                <a:cxn ang="0">
+                  <a:pos x="connsiteX8" y="connsiteY8"/>
+                </a:cxn>
+                <a:cxn ang="0">
+                  <a:pos x="connsiteX9" y="connsiteY9"/>
+                </a:cxn>
+                <a:cxn ang="0">
+                  <a:pos x="connsiteX10" y="connsiteY10"/>
+                </a:cxn>
+                <a:cxn ang="0">
+                  <a:pos x="connsiteX11" y="connsiteY11"/>
+                </a:cxn>
+                <a:cxn ang="0">
+                  <a:pos x="connsiteX12" y="connsiteY12"/>
+                </a:cxn>
+                <a:cxn ang="0">
+                  <a:pos x="connsiteX13" y="connsiteY13"/>
+                </a:cxn>
+                <a:cxn ang="0">
+                  <a:pos x="connsiteX14" y="connsiteY14"/>
+                </a:cxn>
+                <a:cxn ang="0">
+                  <a:pos x="connsiteX15" y="connsiteY15"/>
+                </a:cxn>
+                <a:cxn ang="0">
+                  <a:pos x="connsiteX16" y="connsiteY16"/>
+                </a:cxn>
+                <a:cxn ang="0">
+                  <a:pos x="connsiteX17" y="connsiteY17"/>
+                </a:cxn>
+                <a:cxn ang="0">
+                  <a:pos x="connsiteX18" y="connsiteY18"/>
+                </a:cxn>
+                <a:cxn ang="0">
+                  <a:pos x="connsiteX19" y="connsiteY19"/>
+                </a:cxn>
+                <a:cxn ang="0">
+                  <a:pos x="connsiteX20" y="connsiteY20"/>
+                </a:cxn>
+                <a:cxn ang="0">
+                  <a:pos x="connsiteX21" y="connsiteY21"/>
+                </a:cxn>
+                <a:cxn ang="0">
+                  <a:pos x="connsiteX22" y="connsiteY22"/>
+                </a:cxn>
+                <a:cxn ang="0">
+                  <a:pos x="connsiteX23" y="connsiteY23"/>
+                </a:cxn>
+                <a:cxn ang="0">
+                  <a:pos x="connsiteX24" y="connsiteY24"/>
+                </a:cxn>
+                <a:cxn ang="0">
+                  <a:pos x="connsiteX25" y="connsiteY25"/>
+                </a:cxn>
+                <a:cxn ang="0">
+                  <a:pos x="connsiteX26" y="connsiteY26"/>
+                </a:cxn>
+                <a:cxn ang="0">
+                  <a:pos x="connsiteX27" y="connsiteY27"/>
+                </a:cxn>
+                <a:cxn ang="0">
+                  <a:pos x="connsiteX28" y="connsiteY28"/>
+                </a:cxn>
+                <a:cxn ang="0">
+                  <a:pos x="connsiteX29" y="connsiteY29"/>
+                </a:cxn>
+                <a:cxn ang="0">
+                  <a:pos x="connsiteX30" y="connsiteY30"/>
+                </a:cxn>
+                <a:cxn ang="0">
+                  <a:pos x="connsiteX31" y="connsiteY31"/>
+                </a:cxn>
+                <a:cxn ang="0">
+                  <a:pos x="connsiteX32" y="connsiteY32"/>
+                </a:cxn>
+                <a:cxn ang="0">
+                  <a:pos x="connsiteX33" y="connsiteY33"/>
+                </a:cxn>
+                <a:cxn ang="0">
+                  <a:pos x="connsiteX34" y="connsiteY34"/>
+                </a:cxn>
+                <a:cxn ang="0">
+                  <a:pos x="connsiteX35" y="connsiteY35"/>
+                </a:cxn>
+                <a:cxn ang="0">
+                  <a:pos x="connsiteX36" y="connsiteY36"/>
+                </a:cxn>
+                <a:cxn ang="0">
+                  <a:pos x="connsiteX37" y="connsiteY37"/>
+                </a:cxn>
+                <a:cxn ang="0">
+                  <a:pos x="connsiteX38" y="connsiteY38"/>
+                </a:cxn>
+                <a:cxn ang="0">
+                  <a:pos x="connsiteX39" y="connsiteY39"/>
+                </a:cxn>
+                <a:cxn ang="0">
+                  <a:pos x="connsiteX40" y="connsiteY40"/>
+                </a:cxn>
+                <a:cxn ang="0">
+                  <a:pos x="connsiteX41" y="connsiteY41"/>
+                </a:cxn>
+                <a:cxn ang="0">
+                  <a:pos x="connsiteX42" y="connsiteY42"/>
+                </a:cxn>
+                <a:cxn ang="0">
+                  <a:pos x="connsiteX43" y="connsiteY43"/>
+                </a:cxn>
+                <a:cxn ang="0">
+                  <a:pos x="connsiteX44" y="connsiteY44"/>
+                </a:cxn>
+                <a:cxn ang="0">
+                  <a:pos x="connsiteX45" y="connsiteY45"/>
+                </a:cxn>
+                <a:cxn ang="0">
+                  <a:pos x="connsiteX46" y="connsiteY46"/>
+                </a:cxn>
+                <a:cxn ang="0">
+                  <a:pos x="connsiteX47" y="connsiteY47"/>
+                </a:cxn>
+                <a:cxn ang="0">
+                  <a:pos x="connsiteX48" y="connsiteY48"/>
+                </a:cxn>
+                <a:cxn ang="0">
+                  <a:pos x="connsiteX49" y="connsiteY49"/>
+                </a:cxn>
+                <a:cxn ang="0">
+                  <a:pos x="connsiteX50" y="connsiteY50"/>
+                </a:cxn>
+                <a:cxn ang="0">
+                  <a:pos x="connsiteX51" y="connsiteY51"/>
+                </a:cxn>
+                <a:cxn ang="0">
+                  <a:pos x="connsiteX52" y="connsiteY52"/>
+                </a:cxn>
+                <a:cxn ang="0">
+                  <a:pos x="connsiteX53" y="connsiteY53"/>
+                </a:cxn>
+                <a:cxn ang="0">
+                  <a:pos x="connsiteX54" y="connsiteY54"/>
+                </a:cxn>
+                <a:cxn ang="0">
+                  <a:pos x="connsiteX55" y="connsiteY55"/>
+                </a:cxn>
+                <a:cxn ang="0">
+                  <a:pos x="connsiteX56" y="connsiteY56"/>
+                </a:cxn>
+                <a:cxn ang="0">
+                  <a:pos x="connsiteX57" y="connsiteY57"/>
+                </a:cxn>
+                <a:cxn ang="0">
+                  <a:pos x="connsiteX58" y="connsiteY58"/>
+                </a:cxn>
+                <a:cxn ang="0">
+                  <a:pos x="connsiteX59" y="connsiteY59"/>
+                </a:cxn>
+                <a:cxn ang="0">
+                  <a:pos x="connsiteX60" y="connsiteY60"/>
+                </a:cxn>
+                <a:cxn ang="0">
+                  <a:pos x="connsiteX61" y="connsiteY61"/>
+                </a:cxn>
+                <a:cxn ang="0">
+                  <a:pos x="connsiteX62" y="connsiteY62"/>
+                </a:cxn>
+                <a:cxn ang="0">
+                  <a:pos x="connsiteX63" y="connsiteY63"/>
+                </a:cxn>
+                <a:cxn ang="0">
+                  <a:pos x="connsiteX64" y="connsiteY64"/>
+                </a:cxn>
+              </a:cxnLst>
+              <a:rect l="l" t="t" r="r" b="b"/>
+              <a:pathLst>
+                <a:path w="5646974" h="6483075">
+                  <a:moveTo>
+                    <a:pt x="2405773" y="0"/>
+                  </a:moveTo>
+                  <a:cubicBezTo>
+                    <a:pt x="4195841" y="0"/>
+                    <a:pt x="5646974" y="1451246"/>
+                    <a:pt x="5646974" y="3241538"/>
+                  </a:cubicBezTo>
+                  <a:cubicBezTo>
+                    <a:pt x="5646974" y="5031830"/>
+                    <a:pt x="4195841" y="6483075"/>
+                    <a:pt x="2405773" y="6483075"/>
+                  </a:cubicBezTo>
+                  <a:cubicBezTo>
+                    <a:pt x="1510739" y="6483075"/>
+                    <a:pt x="700439" y="6120264"/>
+                    <a:pt x="113897" y="5533666"/>
+                  </a:cubicBezTo>
+                  <a:lnTo>
+                    <a:pt x="0" y="5408336"/>
+                  </a:lnTo>
+                  <a:lnTo>
+                    <a:pt x="0" y="4983659"/>
+                  </a:lnTo>
+                  <a:lnTo>
+                    <a:pt x="155731" y="5176047"/>
+                  </a:lnTo>
+                  <a:cubicBezTo>
+                    <a:pt x="417742" y="5469073"/>
+                    <a:pt x="741224" y="5704211"/>
+                    <a:pt x="1093706" y="5866903"/>
+                  </a:cubicBezTo>
+                  <a:cubicBezTo>
+                    <a:pt x="1269947" y="5948418"/>
+                    <a:pt x="1453018" y="6013137"/>
+                    <a:pt x="1639673" y="6059940"/>
+                  </a:cubicBezTo>
+                  <a:lnTo>
+                    <a:pt x="1709990" y="6076287"/>
+                  </a:lnTo>
+                  <a:cubicBezTo>
+                    <a:pt x="1733504" y="6081550"/>
+                    <a:pt x="1756570" y="6088156"/>
+                    <a:pt x="1780307" y="6091963"/>
+                  </a:cubicBezTo>
+                  <a:lnTo>
+                    <a:pt x="1851072" y="6105176"/>
+                  </a:lnTo>
+                  <a:lnTo>
+                    <a:pt x="1886455" y="6111782"/>
+                  </a:lnTo>
+                  <a:cubicBezTo>
+                    <a:pt x="1898212" y="6114021"/>
+                    <a:pt x="1909969" y="6116373"/>
+                    <a:pt x="1921949" y="6117716"/>
+                  </a:cubicBezTo>
+                  <a:cubicBezTo>
+                    <a:pt x="1969425" y="6124323"/>
+                    <a:pt x="2016676" y="6131489"/>
+                    <a:pt x="2064152" y="6137647"/>
+                  </a:cubicBezTo>
+                  <a:cubicBezTo>
+                    <a:pt x="2111851" y="6141790"/>
+                    <a:pt x="2159438" y="6146381"/>
+                    <a:pt x="2206914" y="6151195"/>
+                  </a:cubicBezTo>
+                  <a:lnTo>
+                    <a:pt x="2350011" y="6158250"/>
+                  </a:lnTo>
+                  <a:cubicBezTo>
+                    <a:pt x="2397711" y="6159593"/>
+                    <a:pt x="2445410" y="6159146"/>
+                    <a:pt x="2493109" y="6159705"/>
+                  </a:cubicBezTo>
+                  <a:cubicBezTo>
+                    <a:pt x="2589068" y="6158137"/>
+                    <a:pt x="2685922" y="6154666"/>
+                    <a:pt x="2781321" y="6147277"/>
+                  </a:cubicBezTo>
+                  <a:cubicBezTo>
+                    <a:pt x="2972566" y="6132944"/>
+                    <a:pt x="3161348" y="6105288"/>
+                    <a:pt x="3345091" y="6060276"/>
+                  </a:cubicBezTo>
+                  <a:cubicBezTo>
+                    <a:pt x="3528834" y="6015375"/>
+                    <a:pt x="3707539" y="5952785"/>
+                    <a:pt x="3878853" y="5871718"/>
+                  </a:cubicBezTo>
+                  <a:cubicBezTo>
+                    <a:pt x="4050167" y="5790428"/>
+                    <a:pt x="4213084" y="5689318"/>
+                    <a:pt x="4367267" y="5573093"/>
+                  </a:cubicBezTo>
+                  <a:lnTo>
+                    <a:pt x="4424484" y="5528529"/>
+                  </a:lnTo>
+                  <a:cubicBezTo>
+                    <a:pt x="4443631" y="5513637"/>
+                    <a:pt x="4463113" y="5499193"/>
+                    <a:pt x="4481252" y="5483069"/>
+                  </a:cubicBezTo>
+                  <a:lnTo>
+                    <a:pt x="4536790" y="5435818"/>
+                  </a:lnTo>
+                  <a:cubicBezTo>
+                    <a:pt x="4555265" y="5419918"/>
+                    <a:pt x="4574188" y="5404466"/>
+                    <a:pt x="4591543" y="5387671"/>
+                  </a:cubicBezTo>
+                  <a:cubicBezTo>
+                    <a:pt x="4662980" y="5321944"/>
+                    <a:pt x="4733074" y="5254650"/>
+                    <a:pt x="4794209" y="5181198"/>
+                  </a:cubicBezTo>
+                  <a:cubicBezTo>
+                    <a:pt x="4857808" y="5109089"/>
+                    <a:pt x="4910434" y="5029926"/>
+                    <a:pt x="4956678" y="4945836"/>
+                  </a:cubicBezTo>
+                  <a:cubicBezTo>
+                    <a:pt x="4967651" y="4924450"/>
+                    <a:pt x="4978624" y="4903064"/>
+                    <a:pt x="4989262" y="4881453"/>
+                  </a:cubicBezTo>
+                  <a:lnTo>
+                    <a:pt x="5017814" y="4814607"/>
+                  </a:lnTo>
+                  <a:cubicBezTo>
+                    <a:pt x="5027891" y="4792549"/>
+                    <a:pt x="5035393" y="4769035"/>
+                    <a:pt x="5044127" y="4746193"/>
+                  </a:cubicBezTo>
+                  <a:cubicBezTo>
+                    <a:pt x="5052636" y="4723128"/>
+                    <a:pt x="5061146" y="4700174"/>
+                    <a:pt x="5068425" y="4676436"/>
+                  </a:cubicBezTo>
+                  <a:cubicBezTo>
+                    <a:pt x="5099552" y="4582717"/>
+                    <a:pt x="5126985" y="4486422"/>
+                    <a:pt x="5154641" y="4390352"/>
+                  </a:cubicBezTo>
+                  <a:lnTo>
+                    <a:pt x="5196854" y="4246134"/>
+                  </a:lnTo>
+                  <a:lnTo>
+                    <a:pt x="5240299" y="4102140"/>
+                  </a:lnTo>
+                  <a:cubicBezTo>
+                    <a:pt x="5299195" y="3910560"/>
+                    <a:pt x="5364697" y="3721330"/>
+                    <a:pt x="5432440" y="3532884"/>
+                  </a:cubicBezTo>
+                  <a:cubicBezTo>
+                    <a:pt x="5500294" y="3346902"/>
+                    <a:pt x="5533549" y="3148714"/>
+                    <a:pt x="5528846" y="2951647"/>
+                  </a:cubicBezTo>
+                  <a:cubicBezTo>
+                    <a:pt x="5526831" y="2853113"/>
+                    <a:pt x="5515409" y="2755027"/>
+                    <a:pt x="5495927" y="2658733"/>
+                  </a:cubicBezTo>
+                  <a:cubicBezTo>
+                    <a:pt x="5491112" y="2634659"/>
+                    <a:pt x="5486297" y="2610585"/>
+                    <a:pt x="5480027" y="2586848"/>
+                  </a:cubicBezTo>
+                  <a:cubicBezTo>
+                    <a:pt x="5474205" y="2562998"/>
+                    <a:pt x="5468718" y="2539036"/>
+                    <a:pt x="5461328" y="2515635"/>
+                  </a:cubicBezTo>
+                  <a:cubicBezTo>
+                    <a:pt x="5454386" y="2492009"/>
+                    <a:pt x="5447668" y="2468495"/>
+                    <a:pt x="5439605" y="2445317"/>
+                  </a:cubicBezTo>
+                  <a:cubicBezTo>
+                    <a:pt x="5431879" y="2422028"/>
+                    <a:pt x="5424378" y="2398738"/>
+                    <a:pt x="5415532" y="2375896"/>
+                  </a:cubicBezTo>
+                  <a:cubicBezTo>
+                    <a:pt x="5347790" y="2191817"/>
+                    <a:pt x="5254071" y="2018599"/>
+                    <a:pt x="5144564" y="1857138"/>
+                  </a:cubicBezTo>
+                  <a:cubicBezTo>
+                    <a:pt x="5034946" y="1695565"/>
+                    <a:pt x="4909762" y="1545301"/>
+                    <a:pt x="4774838" y="1405450"/>
+                  </a:cubicBezTo>
+                  <a:cubicBezTo>
+                    <a:pt x="4638907" y="1265040"/>
+                    <a:pt x="4496145" y="1132131"/>
+                    <a:pt x="4345769" y="1012323"/>
+                  </a:cubicBezTo>
+                  <a:cubicBezTo>
+                    <a:pt x="4270749" y="952195"/>
+                    <a:pt x="4194273" y="894642"/>
+                    <a:pt x="4115334" y="841344"/>
+                  </a:cubicBezTo>
+                  <a:cubicBezTo>
+                    <a:pt x="4037067" y="787263"/>
+                    <a:pt x="3956336" y="737548"/>
+                    <a:pt x="3874038" y="691528"/>
+                  </a:cubicBezTo>
+                  <a:cubicBezTo>
+                    <a:pt x="3709554" y="599712"/>
+                    <a:pt x="3537792" y="523349"/>
+                    <a:pt x="3359535" y="468819"/>
+                  </a:cubicBezTo>
+                  <a:cubicBezTo>
+                    <a:pt x="3181278" y="414514"/>
+                    <a:pt x="2997311" y="380699"/>
+                    <a:pt x="2811105" y="366031"/>
+                  </a:cubicBezTo>
+                  <a:cubicBezTo>
+                    <a:pt x="2787703" y="364575"/>
+                    <a:pt x="2764525" y="362448"/>
+                    <a:pt x="2741124" y="361440"/>
+                  </a:cubicBezTo>
+                  <a:lnTo>
+                    <a:pt x="2671030" y="358417"/>
+                  </a:lnTo>
+                  <a:lnTo>
+                    <a:pt x="2600713" y="357521"/>
+                  </a:lnTo>
+                  <a:cubicBezTo>
+                    <a:pt x="2577087" y="356961"/>
+                    <a:pt x="2554805" y="358305"/>
+                    <a:pt x="2531739" y="358529"/>
+                  </a:cubicBezTo>
+                  <a:cubicBezTo>
+                    <a:pt x="2440259" y="360992"/>
+                    <a:pt x="2349564" y="370285"/>
+                    <a:pt x="2259988" y="385289"/>
+                  </a:cubicBezTo>
+                  <a:cubicBezTo>
+                    <a:pt x="2080723" y="415521"/>
+                    <a:pt x="1906945" y="473634"/>
+                    <a:pt x="1740670" y="553917"/>
+                  </a:cubicBezTo>
+                  <a:cubicBezTo>
+                    <a:pt x="1574506" y="634647"/>
+                    <a:pt x="1415844" y="737100"/>
+                    <a:pt x="1264124" y="853549"/>
+                  </a:cubicBezTo>
+                  <a:cubicBezTo>
+                    <a:pt x="1112181" y="969886"/>
+                    <a:pt x="966508" y="1099212"/>
+                    <a:pt x="823074" y="1234136"/>
+                  </a:cubicBezTo>
+                  <a:cubicBezTo>
+                    <a:pt x="787131" y="1267951"/>
+                    <a:pt x="751413" y="1301990"/>
+                    <a:pt x="715694" y="1336252"/>
+                  </a:cubicBezTo>
+                  <a:lnTo>
+                    <a:pt x="606859" y="1440945"/>
+                  </a:lnTo>
+                  <a:cubicBezTo>
+                    <a:pt x="532623" y="1511374"/>
+                    <a:pt x="457267" y="1579452"/>
+                    <a:pt x="382023" y="1646074"/>
+                  </a:cubicBezTo>
+                  <a:lnTo>
+                    <a:pt x="158531" y="1843813"/>
+                  </a:lnTo>
+                  <a:lnTo>
+                    <a:pt x="0" y="1991775"/>
+                  </a:lnTo>
+                  <a:lnTo>
+                    <a:pt x="0" y="1074740"/>
+                  </a:lnTo>
+                  <a:lnTo>
+                    <a:pt x="113897" y="949410"/>
+                  </a:lnTo>
+                  <a:cubicBezTo>
+                    <a:pt x="700439" y="362812"/>
+                    <a:pt x="1510739" y="0"/>
+                    <a:pt x="2405773" y="0"/>
+                  </a:cubicBezTo>
+                  <a:close/>
+                </a:path>
+              </a:pathLst>
+            </a:custGeom>
+            <a:gradFill>
+              <a:gsLst>
+                <a:gs pos="2000">
+                  <a:schemeClr val="bg1">
+                    <a:alpha val="10000"/>
+                  </a:schemeClr>
+                </a:gs>
+                <a:gs pos="16000">
+                  <a:schemeClr val="accent6">
+                    <a:alpha val="10000"/>
+                  </a:schemeClr>
+                </a:gs>
+                <a:gs pos="100000">
+                  <a:schemeClr val="bg1">
+                    <a:alpha val="10000"/>
+                  </a:schemeClr>
+                </a:gs>
+                <a:gs pos="85000">
+                  <a:schemeClr val="accent1">
+                    <a:alpha val="10000"/>
+                  </a:schemeClr>
+                </a:gs>
+              </a:gsLst>
+              <a:lin ang="12000000" scaled="0"/>
+            </a:gradFill>
+            <a:ln>
+              <a:noFill/>
+            </a:ln>
+          </p:spPr>
+          <p:style>
+            <a:lnRef idx="2">
+              <a:schemeClr val="accent1">
+                <a:shade val="50000"/>
+              </a:schemeClr>
+            </a:lnRef>
+            <a:fillRef idx="1">
+              <a:schemeClr val="accent1"/>
+            </a:fillRef>
+            <a:effectRef idx="0">
+              <a:schemeClr val="accent1"/>
+            </a:effectRef>
+            <a:fontRef idx="minor">
+              <a:schemeClr val="lt1"/>
+            </a:fontRef>
+          </p:style>
+          <p:txBody>
+            <a:bodyPr wrap="square" rtlCol="0" anchor="ctr">
+              <a:noAutofit/>
+            </a:bodyPr>
+            <a:lstStyle/>
+            <a:p>
+              <a:pPr algn="ctr"/>
+              <a:endParaRPr lang="en-US"/>
+            </a:p>
+          </p:txBody>
+        </p:sp>
+      </p:grpSp>
+      <p:sp>
+        <p:nvSpPr>
+          <p:cNvPr id="2" name="Title 1">
+            <a:extLst>
+              <a:ext uri="{FF2B5EF4-FFF2-40B4-BE49-F238E27FC236}">
+                <a16:creationId xmlns:a16="http://schemas.microsoft.com/office/drawing/2014/main" id="{80ADA2C5-49FB-7674-9839-E6774EFD8FB5}"/>
+              </a:ext>
+            </a:extLst>
+          </p:cNvPr>
+          <p:cNvSpPr>
+            <a:spLocks noGrp="1"/>
+          </p:cNvSpPr>
+          <p:nvPr>
+            <p:ph type="ctrTitle"/>
+          </p:nvPr>
+        </p:nvSpPr>
+        <p:spPr>
+          <a:xfrm>
+            <a:off x="804672" y="3121701"/>
+            <a:ext cx="3658053" cy="2160162"/>
+          </a:xfrm>
+        </p:spPr>
+        <p:txBody>
+          <a:bodyPr anchor="t">
+            <a:normAutofit/>
+          </a:bodyPr>
+          <a:lstStyle/>
+          <a:p>
+            <a:pPr algn="l"/>
+            <a:r>
+              <a:rPr lang="en-US" sz="4000">
+                <a:solidFill>
+                  <a:schemeClr val="tx2"/>
+                </a:solidFill>
+              </a:rPr>
+              <a:t>(real)</a:t>
+            </a:r>
+            <a:br>
+              <a:rPr lang="en-US" sz="4000">
+                <a:solidFill>
+                  <a:schemeClr val="tx2"/>
+                </a:solidFill>
+              </a:rPr>
+            </a:br>
+            <a:r>
+              <a:rPr lang="en-US" sz="4000">
+                <a:solidFill>
+                  <a:schemeClr val="tx2"/>
+                </a:solidFill>
+              </a:rPr>
+              <a:t>Adaptive Font</a:t>
+            </a:r>
+          </a:p>
+        </p:txBody>
+      </p:sp>
+      <p:sp>
+        <p:nvSpPr>
+          <p:cNvPr id="3" name="Subtitle 2">
+            <a:extLst>
+              <a:ext uri="{FF2B5EF4-FFF2-40B4-BE49-F238E27FC236}">
+                <a16:creationId xmlns:a16="http://schemas.microsoft.com/office/drawing/2014/main" id="{B034A775-7DB8-016E-AB8E-850CDC08D788}"/>
+              </a:ext>
+            </a:extLst>
+          </p:cNvPr>
+          <p:cNvSpPr>
+            <a:spLocks noGrp="1"/>
+          </p:cNvSpPr>
+          <p:nvPr>
+            <p:ph type="subTitle" idx="1"/>
+          </p:nvPr>
+        </p:nvSpPr>
+        <p:spPr>
+          <a:xfrm>
+            <a:off x="804672" y="2032347"/>
+            <a:ext cx="3658053" cy="955111"/>
+          </a:xfrm>
+        </p:spPr>
+        <p:txBody>
+          <a:bodyPr anchor="b">
+            <a:normAutofit/>
+          </a:bodyPr>
+          <a:lstStyle/>
+          <a:p>
+            <a:pPr algn="l"/>
+            <a:r>
+              <a:rPr lang="en-US" sz="2000">
+                <a:solidFill>
+                  <a:schemeClr val="tx2"/>
+                </a:solidFill>
+              </a:rPr>
+              <a:t>Arthur Vervaet, Romain Lhotte, Paul Dubois</a:t>
+            </a:r>
+          </a:p>
+        </p:txBody>
+      </p:sp>
+      <p:pic>
+        <p:nvPicPr>
+          <p:cNvPr id="7" name="Graphic 6">
+            <a:extLst>
+              <a:ext uri="{FF2B5EF4-FFF2-40B4-BE49-F238E27FC236}">
+                <a16:creationId xmlns:a16="http://schemas.microsoft.com/office/drawing/2014/main" id="{45A1FCAA-C66E-47C4-E9D4-33632CC4AFEC}"/>
+              </a:ext>
+            </a:extLst>
+          </p:cNvPr>
+          <p:cNvPicPr>
+            <a:picLocks noChangeAspect="1"/>
+          </p:cNvPicPr>
+          <p:nvPr/>
+        </p:nvPicPr>
+        <p:blipFill>
+          <a:blip r:embed="rId2">
+            <a:extLst>
+              <a:ext uri="{28A0092B-C50C-407E-A947-70E740481C1C}">
+                <a14:useLocalDpi xmlns:a14="http://schemas.microsoft.com/office/drawing/2010/main" val="0"/>
+              </a:ext>
+              <a:ext uri="{96DAC541-7B7A-43D3-8B79-37D633B846F1}">
+                <asvg:svgBlip xmlns:asvg="http://schemas.microsoft.com/office/drawing/2016/SVG/main" r:embed="rId3"/>
+              </a:ext>
+            </a:extLst>
+          </a:blip>
+          <a:stretch>
+            <a:fillRect/>
+          </a:stretch>
+        </p:blipFill>
+        <p:spPr>
+          <a:xfrm>
+            <a:off x="6370721" y="1007971"/>
+            <a:ext cx="5031847" cy="4832913"/>
+          </a:xfrm>
+          <a:prstGeom prst="rect">
+            <a:avLst/>
+          </a:prstGeom>
+        </p:spPr>
+      </p:pic>
+    </p:spTree>
+    <p:extLst>
+      <p:ext uri="{BB962C8B-B14F-4D97-AF65-F5344CB8AC3E}">
+        <p14:creationId xmlns:p14="http://schemas.microsoft.com/office/powerpoint/2010/main" val="429973167"/>
+      </p:ext>
+    </p:extLst>
+  </p:cSld>
+  <p:clrMapOvr>
+    <a:masterClrMapping/>
+  </p:clrMapOvr>
+</p:sld>
+</file>
+
 <file path=ppt/theme/theme1.xml><?xml version="1.0" encoding="utf-8"?>
 <a:theme xmlns:a="http://schemas.openxmlformats.org/drawingml/2006/main" name="Office Theme">
   <a:themeElements>

</xml_diff>